<commit_message>
correcoes para apresentacao + iniciio do ppt apresentacao
</commit_message>
<xml_diff>
--- a/Apresentação.pptx
+++ b/Apresentação.pptx
@@ -8,14 +8,15 @@
     <p:sldId id="256" r:id="rId2"/>
     <p:sldId id="259" r:id="rId3"/>
     <p:sldId id="257" r:id="rId4"/>
-    <p:sldId id="260" r:id="rId5"/>
-    <p:sldId id="261" r:id="rId6"/>
-    <p:sldId id="262" r:id="rId7"/>
-    <p:sldId id="263" r:id="rId8"/>
-    <p:sldId id="264" r:id="rId9"/>
-    <p:sldId id="265" r:id="rId10"/>
-    <p:sldId id="266" r:id="rId11"/>
-    <p:sldId id="267" r:id="rId12"/>
+    <p:sldId id="262" r:id="rId5"/>
+    <p:sldId id="270" r:id="rId6"/>
+    <p:sldId id="274" r:id="rId7"/>
+    <p:sldId id="269" r:id="rId8"/>
+    <p:sldId id="268" r:id="rId9"/>
+    <p:sldId id="271" r:id="rId10"/>
+    <p:sldId id="272" r:id="rId11"/>
+    <p:sldId id="273" r:id="rId12"/>
+    <p:sldId id="267" r:id="rId13"/>
   </p:sldIdLst>
   <p:sldSz cx="12192000" cy="6858000"/>
   <p:notesSz cx="6858000" cy="9144000"/>
@@ -347,7 +348,7 @@
             <a:fld id="{5586B75A-687E-405C-8A0B-8D00578BA2C3}" type="datetimeFigureOut">
               <a:rPr lang="en-US" dirty="0"/>
               <a:pPr/>
-              <a:t>6/25/19</a:t>
+              <a:t>11/24/19</a:t>
             </a:fld>
             <a:endParaRPr lang="en-US" dirty="0"/>
           </a:p>
@@ -514,7 +515,7 @@
             <a:fld id="{5586B75A-687E-405C-8A0B-8D00578BA2C3}" type="datetimeFigureOut">
               <a:rPr lang="en-US" dirty="0"/>
               <a:pPr/>
-              <a:t>6/25/19</a:t>
+              <a:t>11/24/19</a:t>
             </a:fld>
             <a:endParaRPr lang="en-US" dirty="0"/>
           </a:p>
@@ -691,7 +692,7 @@
             <a:fld id="{5586B75A-687E-405C-8A0B-8D00578BA2C3}" type="datetimeFigureOut">
               <a:rPr lang="en-US" dirty="0"/>
               <a:pPr/>
-              <a:t>6/25/19</a:t>
+              <a:t>11/24/19</a:t>
             </a:fld>
             <a:endParaRPr lang="en-US" dirty="0"/>
           </a:p>
@@ -858,7 +859,7 @@
             <a:fld id="{5586B75A-687E-405C-8A0B-8D00578BA2C3}" type="datetimeFigureOut">
               <a:rPr lang="en-US" dirty="0"/>
               <a:pPr/>
-              <a:t>6/25/19</a:t>
+              <a:t>11/24/19</a:t>
             </a:fld>
             <a:endParaRPr lang="en-US" dirty="0"/>
           </a:p>
@@ -1113,7 +1114,7 @@
             <a:fld id="{5586B75A-687E-405C-8A0B-8D00578BA2C3}" type="datetimeFigureOut">
               <a:rPr lang="en-US" dirty="0"/>
               <a:pPr/>
-              <a:t>6/25/19</a:t>
+              <a:t>11/24/19</a:t>
             </a:fld>
             <a:endParaRPr lang="en-US" dirty="0"/>
           </a:p>
@@ -1398,7 +1399,7 @@
             <a:fld id="{5586B75A-687E-405C-8A0B-8D00578BA2C3}" type="datetimeFigureOut">
               <a:rPr lang="en-US" dirty="0"/>
               <a:pPr/>
-              <a:t>6/25/19</a:t>
+              <a:t>11/24/19</a:t>
             </a:fld>
             <a:endParaRPr lang="en-US" dirty="0"/>
           </a:p>
@@ -1837,7 +1838,7 @@
             <a:fld id="{5586B75A-687E-405C-8A0B-8D00578BA2C3}" type="datetimeFigureOut">
               <a:rPr lang="en-US" dirty="0"/>
               <a:pPr/>
-              <a:t>6/25/19</a:t>
+              <a:t>11/24/19</a:t>
             </a:fld>
             <a:endParaRPr lang="en-US" dirty="0"/>
           </a:p>
@@ -1952,7 +1953,7 @@
             <a:fld id="{5586B75A-687E-405C-8A0B-8D00578BA2C3}" type="datetimeFigureOut">
               <a:rPr lang="en-US" dirty="0"/>
               <a:pPr/>
-              <a:t>6/25/19</a:t>
+              <a:t>11/24/19</a:t>
             </a:fld>
             <a:endParaRPr lang="en-US" dirty="0"/>
           </a:p>
@@ -2044,7 +2045,7 @@
             <a:fld id="{5586B75A-687E-405C-8A0B-8D00578BA2C3}" type="datetimeFigureOut">
               <a:rPr lang="en-US" dirty="0"/>
               <a:pPr/>
-              <a:t>6/25/19</a:t>
+              <a:t>11/24/19</a:t>
             </a:fld>
             <a:endParaRPr lang="en-US" dirty="0"/>
           </a:p>
@@ -2329,7 +2330,7 @@
             <a:fld id="{5586B75A-687E-405C-8A0B-8D00578BA2C3}" type="datetimeFigureOut">
               <a:rPr lang="en-US" dirty="0"/>
               <a:pPr/>
-              <a:t>6/25/19</a:t>
+              <a:t>11/24/19</a:t>
             </a:fld>
             <a:endParaRPr lang="en-US" dirty="0"/>
           </a:p>
@@ -2599,7 +2600,7 @@
             <a:fld id="{5586B75A-687E-405C-8A0B-8D00578BA2C3}" type="datetimeFigureOut">
               <a:rPr lang="en-US" dirty="0"/>
               <a:pPr/>
-              <a:t>6/25/19</a:t>
+              <a:t>11/24/19</a:t>
             </a:fld>
             <a:endParaRPr lang="en-US" dirty="0"/>
           </a:p>
@@ -2893,7 +2894,7 @@
             <a:fld id="{5586B75A-687E-405C-8A0B-8D00578BA2C3}" type="datetimeFigureOut">
               <a:rPr lang="en-US" dirty="0"/>
               <a:pPr/>
-              <a:t>6/25/19</a:t>
+              <a:t>11/24/19</a:t>
             </a:fld>
             <a:endParaRPr lang="en-US" dirty="0"/>
           </a:p>
@@ -3514,302 +3515,6 @@
           </a:prstGeom>
         </p:spPr>
       </p:pic>
-      <p:sp>
-        <p:nvSpPr>
-          <p:cNvPr id="5" name="Subtítulo 2"/>
-          <p:cNvSpPr txBox="1">
-            <a:spLocks/>
-          </p:cNvSpPr>
-          <p:nvPr/>
-        </p:nvSpPr>
-        <p:spPr>
-          <a:xfrm>
-            <a:off x="0" y="6191036"/>
-            <a:ext cx="8087096" cy="914400"/>
-          </a:xfrm>
-          <a:prstGeom prst="rect">
-            <a:avLst/>
-          </a:prstGeom>
-        </p:spPr>
-        <p:txBody>
-          <a:bodyPr vert="horz" lIns="91440" tIns="45720" rIns="91440" bIns="45720" rtlCol="0" anchor="t">
-            <a:normAutofit/>
-          </a:bodyPr>
-          <a:lstStyle>
-            <a:lvl1pPr marL="0" indent="0" algn="l" defTabSz="914400" rtl="0" eaLnBrk="1" latinLnBrk="0" hangingPunct="1">
-              <a:lnSpc>
-                <a:spcPct val="90000"/>
-              </a:lnSpc>
-              <a:spcBef>
-                <a:spcPts val="1200"/>
-              </a:spcBef>
-              <a:buClr>
-                <a:schemeClr val="accent1"/>
-              </a:buClr>
-              <a:buFont typeface="Wingdings 2" pitchFamily="18" charset="2"/>
-              <a:buNone/>
-              <a:defRPr sz="2200" kern="1200" cap="none" spc="0" baseline="0">
-                <a:solidFill>
-                  <a:schemeClr val="accent1">
-                    <a:lumMod val="20000"/>
-                    <a:lumOff val="80000"/>
-                  </a:schemeClr>
-                </a:solidFill>
-                <a:latin typeface="+mn-lt"/>
-                <a:ea typeface="+mn-ea"/>
-                <a:cs typeface="+mn-cs"/>
-              </a:defRPr>
-            </a:lvl1pPr>
-            <a:lvl2pPr marL="457200" indent="0" algn="ctr" defTabSz="914400" rtl="0" eaLnBrk="1" latinLnBrk="0" hangingPunct="1">
-              <a:lnSpc>
-                <a:spcPct val="90000"/>
-              </a:lnSpc>
-              <a:spcBef>
-                <a:spcPts val="250"/>
-              </a:spcBef>
-              <a:spcAft>
-                <a:spcPts val="250"/>
-              </a:spcAft>
-              <a:buClr>
-                <a:schemeClr val="accent1"/>
-              </a:buClr>
-              <a:buFont typeface="Wingdings 2" pitchFamily="18" charset="2"/>
-              <a:buNone/>
-              <a:defRPr sz="2200" kern="1200">
-                <a:solidFill>
-                  <a:schemeClr val="tx1">
-                    <a:lumMod val="65000"/>
-                    <a:lumOff val="35000"/>
-                  </a:schemeClr>
-                </a:solidFill>
-                <a:latin typeface="+mn-lt"/>
-                <a:ea typeface="+mn-ea"/>
-                <a:cs typeface="+mn-cs"/>
-              </a:defRPr>
-            </a:lvl2pPr>
-            <a:lvl3pPr marL="914400" indent="0" algn="ctr" defTabSz="914400" rtl="0" eaLnBrk="1" latinLnBrk="0" hangingPunct="1">
-              <a:lnSpc>
-                <a:spcPct val="90000"/>
-              </a:lnSpc>
-              <a:spcBef>
-                <a:spcPts val="250"/>
-              </a:spcBef>
-              <a:spcAft>
-                <a:spcPts val="250"/>
-              </a:spcAft>
-              <a:buClr>
-                <a:schemeClr val="accent1"/>
-              </a:buClr>
-              <a:buFont typeface="Wingdings 2" pitchFamily="18" charset="2"/>
-              <a:buNone/>
-              <a:defRPr sz="2200" kern="1200">
-                <a:solidFill>
-                  <a:schemeClr val="tx1">
-                    <a:lumMod val="65000"/>
-                    <a:lumOff val="35000"/>
-                  </a:schemeClr>
-                </a:solidFill>
-                <a:latin typeface="+mn-lt"/>
-                <a:ea typeface="+mn-ea"/>
-                <a:cs typeface="+mn-cs"/>
-              </a:defRPr>
-            </a:lvl3pPr>
-            <a:lvl4pPr marL="1371600" indent="0" algn="ctr" defTabSz="914400" rtl="0" eaLnBrk="1" latinLnBrk="0" hangingPunct="1">
-              <a:lnSpc>
-                <a:spcPct val="90000"/>
-              </a:lnSpc>
-              <a:spcBef>
-                <a:spcPts val="250"/>
-              </a:spcBef>
-              <a:spcAft>
-                <a:spcPts val="250"/>
-              </a:spcAft>
-              <a:buClr>
-                <a:schemeClr val="accent1"/>
-              </a:buClr>
-              <a:buFont typeface="Wingdings 2" pitchFamily="18" charset="2"/>
-              <a:buNone/>
-              <a:defRPr sz="2000" kern="1200">
-                <a:solidFill>
-                  <a:schemeClr val="tx1">
-                    <a:lumMod val="65000"/>
-                    <a:lumOff val="35000"/>
-                  </a:schemeClr>
-                </a:solidFill>
-                <a:latin typeface="+mn-lt"/>
-                <a:ea typeface="+mn-ea"/>
-                <a:cs typeface="+mn-cs"/>
-              </a:defRPr>
-            </a:lvl4pPr>
-            <a:lvl5pPr marL="1828800" indent="0" algn="ctr" defTabSz="914400" rtl="0" eaLnBrk="1" latinLnBrk="0" hangingPunct="1">
-              <a:lnSpc>
-                <a:spcPct val="90000"/>
-              </a:lnSpc>
-              <a:spcBef>
-                <a:spcPts val="250"/>
-              </a:spcBef>
-              <a:spcAft>
-                <a:spcPts val="250"/>
-              </a:spcAft>
-              <a:buClr>
-                <a:schemeClr val="accent1"/>
-              </a:buClr>
-              <a:buFont typeface="Wingdings 2" pitchFamily="18" charset="2"/>
-              <a:buNone/>
-              <a:defRPr sz="2000" kern="1200">
-                <a:solidFill>
-                  <a:schemeClr val="tx1">
-                    <a:lumMod val="65000"/>
-                    <a:lumOff val="35000"/>
-                  </a:schemeClr>
-                </a:solidFill>
-                <a:latin typeface="+mn-lt"/>
-                <a:ea typeface="+mn-ea"/>
-                <a:cs typeface="+mn-cs"/>
-              </a:defRPr>
-            </a:lvl5pPr>
-            <a:lvl6pPr marL="2286000" indent="0" algn="ctr" defTabSz="914400" rtl="0" eaLnBrk="1" latinLnBrk="0" hangingPunct="1">
-              <a:lnSpc>
-                <a:spcPct val="90000"/>
-              </a:lnSpc>
-              <a:spcBef>
-                <a:spcPts val="250"/>
-              </a:spcBef>
-              <a:spcAft>
-                <a:spcPts val="250"/>
-              </a:spcAft>
-              <a:buClr>
-                <a:schemeClr val="accent1"/>
-              </a:buClr>
-              <a:buFont typeface="Wingdings 2" pitchFamily="18" charset="2"/>
-              <a:buNone/>
-              <a:defRPr sz="2000" kern="1200">
-                <a:solidFill>
-                  <a:schemeClr val="tx1">
-                    <a:lumMod val="65000"/>
-                    <a:lumOff val="35000"/>
-                  </a:schemeClr>
-                </a:solidFill>
-                <a:latin typeface="+mn-lt"/>
-                <a:ea typeface="+mn-ea"/>
-                <a:cs typeface="+mn-cs"/>
-              </a:defRPr>
-            </a:lvl6pPr>
-            <a:lvl7pPr marL="2743200" indent="0" algn="ctr" defTabSz="914400" rtl="0" eaLnBrk="1" latinLnBrk="0" hangingPunct="1">
-              <a:lnSpc>
-                <a:spcPct val="90000"/>
-              </a:lnSpc>
-              <a:spcBef>
-                <a:spcPts val="250"/>
-              </a:spcBef>
-              <a:spcAft>
-                <a:spcPts val="250"/>
-              </a:spcAft>
-              <a:buClr>
-                <a:schemeClr val="accent1"/>
-              </a:buClr>
-              <a:buFont typeface="Wingdings 2" pitchFamily="18" charset="2"/>
-              <a:buNone/>
-              <a:defRPr sz="2000" kern="1200">
-                <a:solidFill>
-                  <a:schemeClr val="tx1">
-                    <a:lumMod val="65000"/>
-                    <a:lumOff val="35000"/>
-                  </a:schemeClr>
-                </a:solidFill>
-                <a:latin typeface="+mn-lt"/>
-                <a:ea typeface="+mn-ea"/>
-                <a:cs typeface="+mn-cs"/>
-              </a:defRPr>
-            </a:lvl7pPr>
-            <a:lvl8pPr marL="3200400" indent="0" algn="ctr" defTabSz="914400" rtl="0" eaLnBrk="1" latinLnBrk="0" hangingPunct="1">
-              <a:lnSpc>
-                <a:spcPct val="90000"/>
-              </a:lnSpc>
-              <a:spcBef>
-                <a:spcPts val="250"/>
-              </a:spcBef>
-              <a:spcAft>
-                <a:spcPts val="250"/>
-              </a:spcAft>
-              <a:buClr>
-                <a:schemeClr val="accent1"/>
-              </a:buClr>
-              <a:buFont typeface="Wingdings 2" pitchFamily="18" charset="2"/>
-              <a:buNone/>
-              <a:defRPr sz="2000" kern="1200">
-                <a:solidFill>
-                  <a:schemeClr val="tx1">
-                    <a:lumMod val="65000"/>
-                    <a:lumOff val="35000"/>
-                  </a:schemeClr>
-                </a:solidFill>
-                <a:latin typeface="+mn-lt"/>
-                <a:ea typeface="+mn-ea"/>
-                <a:cs typeface="+mn-cs"/>
-              </a:defRPr>
-            </a:lvl8pPr>
-            <a:lvl9pPr marL="3657600" indent="0" algn="ctr" defTabSz="914400" rtl="0" eaLnBrk="1" latinLnBrk="0" hangingPunct="1">
-              <a:lnSpc>
-                <a:spcPct val="90000"/>
-              </a:lnSpc>
-              <a:spcBef>
-                <a:spcPts val="250"/>
-              </a:spcBef>
-              <a:spcAft>
-                <a:spcPts val="250"/>
-              </a:spcAft>
-              <a:buClr>
-                <a:schemeClr val="accent1"/>
-              </a:buClr>
-              <a:buFont typeface="Wingdings 2" pitchFamily="18" charset="2"/>
-              <a:buNone/>
-              <a:defRPr sz="2000" kern="1200">
-                <a:solidFill>
-                  <a:schemeClr val="tx1">
-                    <a:lumMod val="65000"/>
-                    <a:lumOff val="35000"/>
-                  </a:schemeClr>
-                </a:solidFill>
-                <a:latin typeface="+mn-lt"/>
-                <a:ea typeface="+mn-ea"/>
-                <a:cs typeface="+mn-cs"/>
-              </a:defRPr>
-            </a:lvl9pPr>
-          </a:lstStyle>
-          <a:p>
-            <a:r>
-              <a:rPr lang="pt-BR" sz="1600" dirty="0" smtClean="0">
-                <a:solidFill>
-                  <a:schemeClr val="tx1"/>
-                </a:solidFill>
-              </a:rPr>
-              <a:t>*Todas as imagens/</a:t>
-            </a:r>
-            <a:r>
-              <a:rPr lang="pt-BR" sz="1600" dirty="0" err="1" smtClean="0">
-                <a:solidFill>
-                  <a:schemeClr val="tx1"/>
-                </a:solidFill>
-              </a:rPr>
-              <a:t>prints</a:t>
-            </a:r>
-            <a:r>
-              <a:rPr lang="pt-BR" sz="1600" dirty="0" smtClean="0">
-                <a:solidFill>
-                  <a:schemeClr val="tx1"/>
-                </a:solidFill>
-              </a:rPr>
-              <a:t> da apresentação estão desatualizadas da versão atual do projeto</a:t>
-            </a:r>
-            <a:endParaRPr lang="pt-BR" sz="1600" dirty="0">
-              <a:solidFill>
-                <a:schemeClr val="tx1"/>
-              </a:solidFill>
-            </a:endParaRPr>
-          </a:p>
-        </p:txBody>
-      </p:sp>
     </p:spTree>
     <p:extLst>
       <p:ext uri="{BB962C8B-B14F-4D97-AF65-F5344CB8AC3E}">
@@ -3868,7 +3573,7 @@
                 <a:ea typeface="Arial" charset="0"/>
                 <a:cs typeface="Arial" charset="0"/>
               </a:rPr>
-              <a:t>UX</a:t>
+              <a:t>Slack</a:t>
             </a:r>
             <a:endParaRPr lang="pt-BR" dirty="0">
               <a:latin typeface="Arial" charset="0"/>
@@ -3878,156 +3583,247 @@
           </a:p>
         </p:txBody>
       </p:sp>
-      <p:pic>
-        <p:nvPicPr>
-          <p:cNvPr id="9222" name="Picture 6" descr="esultado de imagem para ux image png"/>
-          <p:cNvPicPr>
-            <a:picLocks noChangeAspect="1" noChangeArrowheads="1"/>
-          </p:cNvPicPr>
+      <p:sp>
+        <p:nvSpPr>
+          <p:cNvPr id="10" name="Título 1"/>
+          <p:cNvSpPr txBox="1">
+            <a:spLocks/>
+          </p:cNvSpPr>
           <p:nvPr/>
-        </p:nvPicPr>
-        <p:blipFill>
-          <a:blip r:embed="rId2">
-            <a:duotone>
-              <a:schemeClr val="accent4">
-                <a:shade val="45000"/>
-                <a:satMod val="135000"/>
-              </a:schemeClr>
-              <a:prstClr val="white"/>
-            </a:duotone>
-            <a:alphaModFix/>
-            <a:extLst>
-              <a:ext uri="{BEBA8EAE-BF5A-486C-A8C5-ECC9F3942E4B}">
-                <a14:imgProps xmlns:a14="http://schemas.microsoft.com/office/drawing/2010/main">
-                  <a14:imgLayer r:embed="rId3">
-                    <a14:imgEffect>
-                      <a14:artisticCrisscrossEtching/>
-                    </a14:imgEffect>
-                    <a14:imgEffect>
-                      <a14:brightnessContrast bright="40000" contrast="40000"/>
-                    </a14:imgEffect>
-                  </a14:imgLayer>
-                </a14:imgProps>
-              </a:ext>
-              <a:ext uri="{28A0092B-C50C-407E-A947-70E740481C1C}">
-                <a14:useLocalDpi xmlns:a14="http://schemas.microsoft.com/office/drawing/2010/main" val="0"/>
-              </a:ext>
-            </a:extLst>
-          </a:blip>
-          <a:srcRect/>
-          <a:stretch>
-            <a:fillRect/>
-          </a:stretch>
-        </p:blipFill>
-        <p:spPr bwMode="auto">
+        </p:nvSpPr>
+        <p:spPr>
           <a:xfrm>
-            <a:off x="1150881" y="2378652"/>
-            <a:ext cx="2102070" cy="2102070"/>
+            <a:off x="7672548" y="4183117"/>
+            <a:ext cx="2947482" cy="2463110"/>
           </a:xfrm>
           <a:prstGeom prst="rect">
             <a:avLst/>
           </a:prstGeom>
-          <a:noFill/>
-          <a:extLst>
-            <a:ext uri="{909E8E84-426E-40DD-AFC4-6F175D3DCCD1}">
-              <a14:hiddenFill xmlns:a14="http://schemas.microsoft.com/office/drawing/2010/main">
+        </p:spPr>
+        <p:txBody>
+          <a:bodyPr vert="horz" lIns="91440" tIns="45720" rIns="91440" bIns="45720" rtlCol="0" anchor="ctr">
+            <a:normAutofit/>
+          </a:bodyPr>
+          <a:lstStyle>
+            <a:lvl1pPr algn="l" defTabSz="914400" rtl="0" eaLnBrk="1" latinLnBrk="0" hangingPunct="1">
+              <a:lnSpc>
+                <a:spcPct val="90000"/>
+              </a:lnSpc>
+              <a:spcBef>
+                <a:spcPct val="0"/>
+              </a:spcBef>
+              <a:buNone/>
+              <a:defRPr sz="3600" kern="1200" spc="-60" baseline="0">
                 <a:solidFill>
                   <a:srgbClr val="FFFFFF"/>
                 </a:solidFill>
-              </a14:hiddenFill>
-            </a:ext>
-          </a:extLst>
-        </p:spPr>
-      </p:pic>
-      <p:grpSp>
-        <p:nvGrpSpPr>
-          <p:cNvPr id="9" name="Grupo 8"/>
-          <p:cNvGrpSpPr/>
-          <p:nvPr/>
-        </p:nvGrpSpPr>
-        <p:grpSpPr>
-          <a:xfrm>
-            <a:off x="3531474" y="1274353"/>
-            <a:ext cx="8192441" cy="4450667"/>
-            <a:chOff x="3499943" y="1628271"/>
-            <a:chExt cx="8192441" cy="4450667"/>
-          </a:xfrm>
-        </p:grpSpPr>
-        <p:pic>
-          <p:nvPicPr>
-            <p:cNvPr id="7" name="Imagem 6"/>
-            <p:cNvPicPr>
-              <a:picLocks noChangeAspect="1"/>
-            </p:cNvPicPr>
-            <p:nvPr/>
-          </p:nvPicPr>
-          <p:blipFill>
-            <a:blip r:embed="rId4">
-              <a:extLst>
-                <a:ext uri="{28A0092B-C50C-407E-A947-70E740481C1C}">
-                  <a14:useLocalDpi xmlns:a14="http://schemas.microsoft.com/office/drawing/2010/main" val="0"/>
-                </a:ext>
-              </a:extLst>
-            </a:blip>
-            <a:stretch>
-              <a:fillRect/>
-            </a:stretch>
-          </p:blipFill>
-          <p:spPr>
-            <a:xfrm>
-              <a:off x="3499943" y="1628271"/>
-              <a:ext cx="7998373" cy="439410"/>
-            </a:xfrm>
-            <a:prstGeom prst="rect">
-              <a:avLst/>
-            </a:prstGeom>
-          </p:spPr>
-        </p:pic>
-        <p:pic>
-          <p:nvPicPr>
-            <p:cNvPr id="8" name="Imagem 7"/>
-            <p:cNvPicPr>
-              <a:picLocks noChangeAspect="1"/>
-            </p:cNvPicPr>
-            <p:nvPr/>
-          </p:nvPicPr>
-          <p:blipFill>
-            <a:blip r:embed="rId5">
-              <a:extLst>
-                <a:ext uri="{28A0092B-C50C-407E-A947-70E740481C1C}">
-                  <a14:useLocalDpi xmlns:a14="http://schemas.microsoft.com/office/drawing/2010/main" val="0"/>
-                </a:ext>
-              </a:extLst>
-            </a:blip>
-            <a:stretch>
-              <a:fillRect/>
-            </a:stretch>
-          </p:blipFill>
-          <p:spPr>
-            <a:xfrm>
-              <a:off x="3499943" y="2459421"/>
-              <a:ext cx="8192441" cy="3619517"/>
-            </a:xfrm>
-            <a:prstGeom prst="rect">
-              <a:avLst/>
-            </a:prstGeom>
-          </p:spPr>
-        </p:pic>
-      </p:grpSp>
+                <a:latin typeface="+mj-lt"/>
+                <a:ea typeface="+mj-ea"/>
+                <a:cs typeface="+mj-cs"/>
+              </a:defRPr>
+            </a:lvl1pPr>
+          </a:lstStyle>
+          <a:p>
+            <a:r>
+              <a:rPr lang="pt-BR" dirty="0" smtClean="0">
+                <a:latin typeface="Arial" charset="0"/>
+                <a:ea typeface="Arial" charset="0"/>
+                <a:cs typeface="Arial" charset="0"/>
+              </a:rPr>
+              <a:t>package.json</a:t>
+            </a:r>
+            <a:endParaRPr lang="pt-BR" dirty="0">
+              <a:latin typeface="Arial" charset="0"/>
+              <a:ea typeface="Arial" charset="0"/>
+              <a:cs typeface="Arial" charset="0"/>
+            </a:endParaRPr>
+          </a:p>
+        </p:txBody>
+      </p:sp>
+      <p:sp>
+        <p:nvSpPr>
+          <p:cNvPr id="3" name="Espaço Reservado para Conteúdo 2"/>
+          <p:cNvSpPr>
+            <a:spLocks noGrp="1"/>
+          </p:cNvSpPr>
+          <p:nvPr>
+            <p:ph idx="1"/>
+          </p:nvPr>
+        </p:nvSpPr>
+        <p:spPr/>
+        <p:txBody>
+          <a:bodyPr/>
+          <a:lstStyle/>
+          <a:p>
+            <a:endParaRPr lang="pt-BR"/>
+          </a:p>
+        </p:txBody>
+      </p:sp>
     </p:spTree>
     <p:extLst>
       <p:ext uri="{BB962C8B-B14F-4D97-AF65-F5344CB8AC3E}">
-        <p14:creationId xmlns:p14="http://schemas.microsoft.com/office/powerpoint/2010/main" val="1144108930"/>
+        <p14:creationId xmlns:p14="http://schemas.microsoft.com/office/powerpoint/2010/main" val="1229982810"/>
       </p:ext>
     </p:extLst>
   </p:cSld>
   <p:clrMapOvr>
     <a:masterClrMapping/>
   </p:clrMapOvr>
+  <p:timing>
+    <p:tnLst>
+      <p:par>
+        <p:cTn id="1" dur="indefinite" restart="never" nodeType="tmRoot"/>
+      </p:par>
+    </p:tnLst>
+  </p:timing>
 </p:sld>
 </file>
 
 <file path=ppt/slides/slide11.xml><?xml version="1.0" encoding="utf-8"?>
+<p:sld xmlns:a="http://schemas.openxmlformats.org/drawingml/2006/main" xmlns:r="http://schemas.openxmlformats.org/officeDocument/2006/relationships" xmlns:p="http://schemas.openxmlformats.org/presentationml/2006/main">
+  <p:cSld>
+    <p:spTree>
+      <p:nvGrpSpPr>
+        <p:cNvPr id="1" name=""/>
+        <p:cNvGrpSpPr/>
+        <p:nvPr/>
+      </p:nvGrpSpPr>
+      <p:grpSpPr>
+        <a:xfrm>
+          <a:off x="0" y="0"/>
+          <a:ext cx="0" cy="0"/>
+          <a:chOff x="0" y="0"/>
+          <a:chExt cx="0" cy="0"/>
+        </a:xfrm>
+      </p:grpSpPr>
+      <p:sp>
+        <p:nvSpPr>
+          <p:cNvPr id="2" name="Título 1"/>
+          <p:cNvSpPr>
+            <a:spLocks noGrp="1"/>
+          </p:cNvSpPr>
+          <p:nvPr>
+            <p:ph type="title"/>
+          </p:nvPr>
+        </p:nvSpPr>
+        <p:spPr/>
+        <p:txBody>
+          <a:bodyPr/>
+          <a:lstStyle/>
+          <a:p>
+            <a:r>
+              <a:rPr lang="pt-BR" dirty="0" smtClean="0">
+                <a:latin typeface="Arial" charset="0"/>
+                <a:ea typeface="Arial" charset="0"/>
+                <a:cs typeface="Arial" charset="0"/>
+              </a:rPr>
+              <a:t>Resumo</a:t>
+            </a:r>
+            <a:endParaRPr lang="pt-BR" dirty="0">
+              <a:latin typeface="Arial" charset="0"/>
+              <a:ea typeface="Arial" charset="0"/>
+              <a:cs typeface="Arial" charset="0"/>
+            </a:endParaRPr>
+          </a:p>
+        </p:txBody>
+      </p:sp>
+      <p:sp>
+        <p:nvSpPr>
+          <p:cNvPr id="10" name="Título 1"/>
+          <p:cNvSpPr txBox="1">
+            <a:spLocks/>
+          </p:cNvSpPr>
+          <p:nvPr/>
+        </p:nvSpPr>
+        <p:spPr>
+          <a:xfrm>
+            <a:off x="7672548" y="4183117"/>
+            <a:ext cx="2947482" cy="2463110"/>
+          </a:xfrm>
+          <a:prstGeom prst="rect">
+            <a:avLst/>
+          </a:prstGeom>
+        </p:spPr>
+        <p:txBody>
+          <a:bodyPr vert="horz" lIns="91440" tIns="45720" rIns="91440" bIns="45720" rtlCol="0" anchor="ctr">
+            <a:normAutofit/>
+          </a:bodyPr>
+          <a:lstStyle>
+            <a:lvl1pPr algn="l" defTabSz="914400" rtl="0" eaLnBrk="1" latinLnBrk="0" hangingPunct="1">
+              <a:lnSpc>
+                <a:spcPct val="90000"/>
+              </a:lnSpc>
+              <a:spcBef>
+                <a:spcPct val="0"/>
+              </a:spcBef>
+              <a:buNone/>
+              <a:defRPr sz="3600" kern="1200" spc="-60" baseline="0">
+                <a:solidFill>
+                  <a:srgbClr val="FFFFFF"/>
+                </a:solidFill>
+                <a:latin typeface="+mj-lt"/>
+                <a:ea typeface="+mj-ea"/>
+                <a:cs typeface="+mj-cs"/>
+              </a:defRPr>
+            </a:lvl1pPr>
+          </a:lstStyle>
+          <a:p>
+            <a:r>
+              <a:rPr lang="pt-BR" dirty="0" smtClean="0">
+                <a:latin typeface="Arial" charset="0"/>
+                <a:ea typeface="Arial" charset="0"/>
+                <a:cs typeface="Arial" charset="0"/>
+              </a:rPr>
+              <a:t>package.json</a:t>
+            </a:r>
+            <a:endParaRPr lang="pt-BR" dirty="0">
+              <a:latin typeface="Arial" charset="0"/>
+              <a:ea typeface="Arial" charset="0"/>
+              <a:cs typeface="Arial" charset="0"/>
+            </a:endParaRPr>
+          </a:p>
+        </p:txBody>
+      </p:sp>
+      <p:sp>
+        <p:nvSpPr>
+          <p:cNvPr id="3" name="Espaço Reservado para Conteúdo 2"/>
+          <p:cNvSpPr>
+            <a:spLocks noGrp="1"/>
+          </p:cNvSpPr>
+          <p:nvPr>
+            <p:ph idx="1"/>
+          </p:nvPr>
+        </p:nvSpPr>
+        <p:spPr/>
+        <p:txBody>
+          <a:bodyPr/>
+          <a:lstStyle/>
+          <a:p>
+            <a:endParaRPr lang="pt-BR"/>
+          </a:p>
+        </p:txBody>
+      </p:sp>
+    </p:spTree>
+    <p:extLst>
+      <p:ext uri="{BB962C8B-B14F-4D97-AF65-F5344CB8AC3E}">
+        <p14:creationId xmlns:p14="http://schemas.microsoft.com/office/powerpoint/2010/main" val="2030289125"/>
+      </p:ext>
+    </p:extLst>
+  </p:cSld>
+  <p:clrMapOvr>
+    <a:masterClrMapping/>
+  </p:clrMapOvr>
+  <p:timing>
+    <p:tnLst>
+      <p:par>
+        <p:cTn id="1" dur="indefinite" restart="never" nodeType="tmRoot"/>
+      </p:par>
+    </p:tnLst>
+  </p:timing>
+</p:sld>
+</file>
+
+<file path=ppt/slides/slide12.xml><?xml version="1.0" encoding="utf-8"?>
 <p:sld xmlns:a="http://schemas.openxmlformats.org/drawingml/2006/main" xmlns:r="http://schemas.openxmlformats.org/officeDocument/2006/relationships" xmlns:p="http://schemas.openxmlformats.org/presentationml/2006/main">
   <p:cSld>
     <p:spTree>
@@ -4515,7 +4311,7 @@
                 <a:ea typeface="Arial" charset="0"/>
                 <a:cs typeface="Arial" charset="0"/>
               </a:rPr>
-              <a:t>GitHub</a:t>
+              <a:t>Utilitários</a:t>
             </a:r>
             <a:endParaRPr lang="pt-BR" dirty="0">
               <a:latin typeface="Arial" charset="0"/>
@@ -4525,9 +4321,105 @@
           </a:p>
         </p:txBody>
       </p:sp>
+      <p:sp>
+        <p:nvSpPr>
+          <p:cNvPr id="10" name="Título 1"/>
+          <p:cNvSpPr txBox="1">
+            <a:spLocks/>
+          </p:cNvSpPr>
+          <p:nvPr/>
+        </p:nvSpPr>
+        <p:spPr>
+          <a:xfrm>
+            <a:off x="7672548" y="4183117"/>
+            <a:ext cx="2947482" cy="2463110"/>
+          </a:xfrm>
+          <a:prstGeom prst="rect">
+            <a:avLst/>
+          </a:prstGeom>
+        </p:spPr>
+        <p:txBody>
+          <a:bodyPr vert="horz" lIns="91440" tIns="45720" rIns="91440" bIns="45720" rtlCol="0" anchor="ctr">
+            <a:normAutofit/>
+          </a:bodyPr>
+          <a:lstStyle>
+            <a:lvl1pPr algn="l" defTabSz="914400" rtl="0" eaLnBrk="1" latinLnBrk="0" hangingPunct="1">
+              <a:lnSpc>
+                <a:spcPct val="90000"/>
+              </a:lnSpc>
+              <a:spcBef>
+                <a:spcPct val="0"/>
+              </a:spcBef>
+              <a:buNone/>
+              <a:defRPr sz="3600" kern="1200" spc="-60" baseline="0">
+                <a:solidFill>
+                  <a:srgbClr val="FFFFFF"/>
+                </a:solidFill>
+                <a:latin typeface="+mj-lt"/>
+                <a:ea typeface="+mj-ea"/>
+                <a:cs typeface="+mj-cs"/>
+              </a:defRPr>
+            </a:lvl1pPr>
+          </a:lstStyle>
+          <a:p>
+            <a:r>
+              <a:rPr lang="pt-BR" dirty="0" smtClean="0">
+                <a:latin typeface="Arial" charset="0"/>
+                <a:ea typeface="Arial" charset="0"/>
+                <a:cs typeface="Arial" charset="0"/>
+              </a:rPr>
+              <a:t>package.json</a:t>
+            </a:r>
+            <a:endParaRPr lang="pt-BR" dirty="0">
+              <a:latin typeface="Arial" charset="0"/>
+              <a:ea typeface="Arial" charset="0"/>
+              <a:cs typeface="Arial" charset="0"/>
+            </a:endParaRPr>
+          </a:p>
+        </p:txBody>
+      </p:sp>
+      <p:sp>
+        <p:nvSpPr>
+          <p:cNvPr id="5" name="Espaço Reservado para Conteúdo 4"/>
+          <p:cNvSpPr>
+            <a:spLocks noGrp="1"/>
+          </p:cNvSpPr>
+          <p:nvPr>
+            <p:ph idx="1"/>
+          </p:nvPr>
+        </p:nvSpPr>
+        <p:spPr/>
+        <p:txBody>
+          <a:bodyPr/>
+          <a:lstStyle/>
+          <a:p>
+            <a:r>
+              <a:rPr lang="pt-BR" dirty="0" err="1" smtClean="0"/>
+              <a:t>Pyhton</a:t>
+            </a:r>
+            <a:r>
+              <a:rPr lang="pt-BR" dirty="0" smtClean="0"/>
+              <a:t>, </a:t>
+            </a:r>
+            <a:r>
+              <a:rPr lang="pt-BR" dirty="0" err="1" smtClean="0"/>
+              <a:t>flask</a:t>
+            </a:r>
+            <a:r>
+              <a:rPr lang="pt-BR" dirty="0" smtClean="0"/>
+              <a:t>, </a:t>
+            </a:r>
+            <a:r>
+              <a:rPr lang="pt-BR" dirty="0" err="1" smtClean="0"/>
+              <a:t>sqlaclhemy,slack</a:t>
+            </a:r>
+            <a:endParaRPr lang="pt-BR" dirty="0"/>
+          </a:p>
+        </p:txBody>
+      </p:sp>
       <p:pic>
         <p:nvPicPr>
-          <p:cNvPr id="1028" name="Picture 4" descr="esultado de imagem para github image png"/>
+          <p:cNvPr id="1030" name="Picture 6" descr="esultado de imagem para python logo png"/>
           <p:cNvPicPr>
             <a:picLocks noChangeAspect="1" noChangeArrowheads="1"/>
           </p:cNvPicPr>
@@ -4547,9 +4439,9 @@
           </a:stretch>
         </p:blipFill>
         <p:spPr bwMode="auto">
-          <a:xfrm flipH="1">
-            <a:off x="1992700" y="2820577"/>
-            <a:ext cx="1207701" cy="1207701"/>
+          <a:xfrm>
+            <a:off x="2157554" y="2722947"/>
+            <a:ext cx="1147276" cy="1460170"/>
           </a:xfrm>
           <a:prstGeom prst="rect">
             <a:avLst/>
@@ -4566,38 +4458,10 @@
           </a:extLst>
         </p:spPr>
       </p:pic>
-      <p:pic>
-        <p:nvPicPr>
-          <p:cNvPr id="7" name="Espaço Reservado para Conteúdo 6"/>
-          <p:cNvPicPr>
-            <a:picLocks noGrp="1" noChangeAspect="1"/>
-          </p:cNvPicPr>
-          <p:nvPr>
-            <p:ph idx="1"/>
-          </p:nvPr>
-        </p:nvPicPr>
-        <p:blipFill rotWithShape="1">
-          <a:blip r:embed="rId3">
-            <a:extLst>
-              <a:ext uri="{28A0092B-C50C-407E-A947-70E740481C1C}">
-                <a14:useLocalDpi xmlns:a14="http://schemas.microsoft.com/office/drawing/2010/main" val="0"/>
-              </a:ext>
-            </a:extLst>
-          </a:blip>
-          <a:srcRect b="54446"/>
-          <a:stretch/>
-        </p:blipFill>
-        <p:spPr>
-          <a:xfrm>
-            <a:off x="3484190" y="1743327"/>
-            <a:ext cx="8256468" cy="3102758"/>
-          </a:xfrm>
-        </p:spPr>
-      </p:pic>
     </p:spTree>
     <p:extLst>
       <p:ext uri="{BB962C8B-B14F-4D97-AF65-F5344CB8AC3E}">
-        <p14:creationId xmlns:p14="http://schemas.microsoft.com/office/powerpoint/2010/main" val="745605363"/>
+        <p14:creationId xmlns:p14="http://schemas.microsoft.com/office/powerpoint/2010/main" val="1714140654"/>
       </p:ext>
     </p:extLst>
   </p:cSld>
@@ -4652,7 +4516,7 @@
                 <a:ea typeface="Arial" charset="0"/>
                 <a:cs typeface="Arial" charset="0"/>
               </a:rPr>
-              <a:t>Protótipo</a:t>
+              <a:t>Banco de Dados</a:t>
             </a:r>
             <a:endParaRPr lang="pt-BR" dirty="0">
               <a:latin typeface="Arial" charset="0"/>
@@ -4662,45 +4526,92 @@
           </a:p>
         </p:txBody>
       </p:sp>
+      <p:sp>
+        <p:nvSpPr>
+          <p:cNvPr id="10" name="Título 1"/>
+          <p:cNvSpPr txBox="1">
+            <a:spLocks/>
+          </p:cNvSpPr>
+          <p:nvPr/>
+        </p:nvSpPr>
+        <p:spPr>
+          <a:xfrm>
+            <a:off x="7672548" y="4183117"/>
+            <a:ext cx="2947482" cy="2463110"/>
+          </a:xfrm>
+          <a:prstGeom prst="rect">
+            <a:avLst/>
+          </a:prstGeom>
+        </p:spPr>
+        <p:txBody>
+          <a:bodyPr vert="horz" lIns="91440" tIns="45720" rIns="91440" bIns="45720" rtlCol="0" anchor="ctr">
+            <a:normAutofit/>
+          </a:bodyPr>
+          <a:lstStyle>
+            <a:lvl1pPr algn="l" defTabSz="914400" rtl="0" eaLnBrk="1" latinLnBrk="0" hangingPunct="1">
+              <a:lnSpc>
+                <a:spcPct val="90000"/>
+              </a:lnSpc>
+              <a:spcBef>
+                <a:spcPct val="0"/>
+              </a:spcBef>
+              <a:buNone/>
+              <a:defRPr sz="3600" kern="1200" spc="-60" baseline="0">
+                <a:solidFill>
+                  <a:srgbClr val="FFFFFF"/>
+                </a:solidFill>
+                <a:latin typeface="+mj-lt"/>
+                <a:ea typeface="+mj-ea"/>
+                <a:cs typeface="+mj-cs"/>
+              </a:defRPr>
+            </a:lvl1pPr>
+          </a:lstStyle>
+          <a:p>
+            <a:r>
+              <a:rPr lang="pt-BR" dirty="0" smtClean="0">
+                <a:latin typeface="Arial" charset="0"/>
+                <a:ea typeface="Arial" charset="0"/>
+                <a:cs typeface="Arial" charset="0"/>
+              </a:rPr>
+              <a:t>package.json</a:t>
+            </a:r>
+            <a:endParaRPr lang="pt-BR" dirty="0">
+              <a:latin typeface="Arial" charset="0"/>
+              <a:ea typeface="Arial" charset="0"/>
+              <a:cs typeface="Arial" charset="0"/>
+            </a:endParaRPr>
+          </a:p>
+        </p:txBody>
+      </p:sp>
+      <p:sp>
+        <p:nvSpPr>
+          <p:cNvPr id="3" name="Espaço Reservado para Conteúdo 2"/>
+          <p:cNvSpPr>
+            <a:spLocks noGrp="1"/>
+          </p:cNvSpPr>
+          <p:nvPr>
+            <p:ph idx="1"/>
+          </p:nvPr>
+        </p:nvSpPr>
+        <p:spPr/>
+        <p:txBody>
+          <a:bodyPr/>
+          <a:lstStyle/>
+          <a:p>
+            <a:endParaRPr lang="pt-BR" dirty="0"/>
+          </a:p>
+        </p:txBody>
+      </p:sp>
       <p:pic>
         <p:nvPicPr>
-          <p:cNvPr id="5" name="Espaço Reservado para Conteúdo 4"/>
-          <p:cNvPicPr>
-            <a:picLocks noGrp="1" noChangeAspect="1"/>
-          </p:cNvPicPr>
-          <p:nvPr>
-            <p:ph idx="1"/>
-          </p:nvPr>
-        </p:nvPicPr>
-        <p:blipFill>
-          <a:blip r:embed="rId2">
-            <a:extLst>
-              <a:ext uri="{28A0092B-C50C-407E-A947-70E740481C1C}">
-                <a14:useLocalDpi xmlns:a14="http://schemas.microsoft.com/office/drawing/2010/main" val="0"/>
-              </a:ext>
-            </a:extLst>
-          </a:blip>
-          <a:stretch>
-            <a:fillRect/>
-          </a:stretch>
-        </p:blipFill>
-        <p:spPr>
-          <a:xfrm>
-            <a:off x="5010228" y="133273"/>
-            <a:ext cx="4659283" cy="6576012"/>
-          </a:xfrm>
-        </p:spPr>
-      </p:pic>
-      <p:pic>
-        <p:nvPicPr>
-          <p:cNvPr id="5124" name="Picture 4" descr="magem relacionada"/>
+          <p:cNvPr id="2054" name="Picture 6" descr="esultado de imagem para banco de dados png"/>
           <p:cNvPicPr>
             <a:picLocks noChangeAspect="1" noChangeArrowheads="1"/>
           </p:cNvPicPr>
           <p:nvPr/>
         </p:nvPicPr>
         <p:blipFill>
-          <a:blip r:embed="rId3">
+          <a:blip r:embed="rId2">
             <a:extLst>
               <a:ext uri="{28A0092B-C50C-407E-A947-70E740481C1C}">
                 <a14:useLocalDpi xmlns:a14="http://schemas.microsoft.com/office/drawing/2010/main" val="0"/>
@@ -4714,8 +4625,8 @@
         </p:blipFill>
         <p:spPr bwMode="auto">
           <a:xfrm>
-            <a:off x="2275675" y="2897581"/>
-            <a:ext cx="1045404" cy="1045404"/>
+            <a:off x="2282043" y="3051959"/>
+            <a:ext cx="918358" cy="918358"/>
           </a:xfrm>
           <a:prstGeom prst="rect">
             <a:avLst/>
@@ -4735,7 +4646,7 @@
     </p:spTree>
     <p:extLst>
       <p:ext uri="{BB962C8B-B14F-4D97-AF65-F5344CB8AC3E}">
-        <p14:creationId xmlns:p14="http://schemas.microsoft.com/office/powerpoint/2010/main" val="393443747"/>
+        <p14:creationId xmlns:p14="http://schemas.microsoft.com/office/powerpoint/2010/main" val="576531390"/>
       </p:ext>
     </p:extLst>
   </p:cSld>
@@ -4790,7 +4701,7 @@
                 <a:ea typeface="Arial" charset="0"/>
                 <a:cs typeface="Arial" charset="0"/>
               </a:rPr>
-              <a:t>NPM</a:t>
+              <a:t>Banco de Dados</a:t>
             </a:r>
             <a:endParaRPr lang="pt-BR" dirty="0">
               <a:latin typeface="Arial" charset="0"/>
@@ -4800,137 +4711,6 @@
           </a:p>
         </p:txBody>
       </p:sp>
-      <p:grpSp>
-        <p:nvGrpSpPr>
-          <p:cNvPr id="4" name="Grupo 3"/>
-          <p:cNvGrpSpPr/>
-          <p:nvPr/>
-        </p:nvGrpSpPr>
-        <p:grpSpPr>
-          <a:xfrm>
-            <a:off x="1726660" y="2791279"/>
-            <a:ext cx="1260000" cy="1260000"/>
-            <a:chOff x="1726660" y="2795755"/>
-            <a:chExt cx="1260000" cy="1260000"/>
-          </a:xfrm>
-        </p:grpSpPr>
-        <p:pic>
-          <p:nvPicPr>
-            <p:cNvPr id="6146" name="Picture 2" descr="esultado de imagem para npm image png"/>
-            <p:cNvPicPr>
-              <a:picLocks noChangeAspect="1" noChangeArrowheads="1"/>
-            </p:cNvPicPr>
-            <p:nvPr/>
-          </p:nvPicPr>
-          <p:blipFill>
-            <a:blip r:embed="rId2">
-              <a:extLst>
-                <a:ext uri="{28A0092B-C50C-407E-A947-70E740481C1C}">
-                  <a14:useLocalDpi xmlns:a14="http://schemas.microsoft.com/office/drawing/2010/main" val="0"/>
-                </a:ext>
-              </a:extLst>
-            </a:blip>
-            <a:srcRect/>
-            <a:stretch>
-              <a:fillRect/>
-            </a:stretch>
-          </p:blipFill>
-          <p:spPr bwMode="auto">
-            <a:xfrm>
-              <a:off x="1893897" y="3236446"/>
-              <a:ext cx="943896" cy="367235"/>
-            </a:xfrm>
-            <a:prstGeom prst="rect">
-              <a:avLst/>
-            </a:prstGeom>
-            <a:noFill/>
-            <a:extLst>
-              <a:ext uri="{909E8E84-426E-40DD-AFC4-6F175D3DCCD1}">
-                <a14:hiddenFill xmlns:a14="http://schemas.microsoft.com/office/drawing/2010/main">
-                  <a:solidFill>
-                    <a:srgbClr val="FFFFFF"/>
-                  </a:solidFill>
-                </a14:hiddenFill>
-              </a:ext>
-            </a:extLst>
-          </p:spPr>
-        </p:pic>
-        <p:sp>
-          <p:nvSpPr>
-            <p:cNvPr id="3" name="Rosca 2"/>
-            <p:cNvSpPr/>
-            <p:nvPr/>
-          </p:nvSpPr>
-          <p:spPr>
-            <a:xfrm>
-              <a:off x="1726660" y="2795755"/>
-              <a:ext cx="1260000" cy="1260000"/>
-            </a:xfrm>
-            <a:prstGeom prst="donut">
-              <a:avLst>
-                <a:gd name="adj" fmla="val 3798"/>
-              </a:avLst>
-            </a:prstGeom>
-          </p:spPr>
-          <p:style>
-            <a:lnRef idx="2">
-              <a:schemeClr val="dk1">
-                <a:shade val="50000"/>
-              </a:schemeClr>
-            </a:lnRef>
-            <a:fillRef idx="1">
-              <a:schemeClr val="dk1"/>
-            </a:fillRef>
-            <a:effectRef idx="0">
-              <a:schemeClr val="dk1"/>
-            </a:effectRef>
-            <a:fontRef idx="minor">
-              <a:schemeClr val="lt1"/>
-            </a:fontRef>
-          </p:style>
-          <p:txBody>
-            <a:bodyPr rtlCol="0" anchor="ctr"/>
-            <a:lstStyle/>
-            <a:p>
-              <a:pPr algn="ctr"/>
-              <a:endParaRPr lang="pt-BR">
-                <a:solidFill>
-                  <a:schemeClr val="tx1"/>
-                </a:solidFill>
-              </a:endParaRPr>
-            </a:p>
-          </p:txBody>
-        </p:sp>
-      </p:grpSp>
-      <p:pic>
-        <p:nvPicPr>
-          <p:cNvPr id="7" name="Espaço Reservado para Conteúdo 6"/>
-          <p:cNvPicPr>
-            <a:picLocks noGrp="1" noChangeAspect="1"/>
-          </p:cNvPicPr>
-          <p:nvPr>
-            <p:ph idx="1"/>
-          </p:nvPr>
-        </p:nvPicPr>
-        <p:blipFill>
-          <a:blip r:embed="rId3">
-            <a:extLst>
-              <a:ext uri="{28A0092B-C50C-407E-A947-70E740481C1C}">
-                <a14:useLocalDpi xmlns:a14="http://schemas.microsoft.com/office/drawing/2010/main" val="0"/>
-              </a:ext>
-            </a:extLst>
-          </a:blip>
-          <a:stretch>
-            <a:fillRect/>
-          </a:stretch>
-        </p:blipFill>
-        <p:spPr>
-          <a:xfrm>
-            <a:off x="4319749" y="76922"/>
-            <a:ext cx="6537433" cy="6649971"/>
-          </a:xfrm>
-        </p:spPr>
-      </p:pic>
       <p:sp>
         <p:nvSpPr>
           <p:cNvPr id="10" name="Título 1"/>
@@ -4988,10 +4768,70 @@
           </a:p>
         </p:txBody>
       </p:sp>
+      <p:sp>
+        <p:nvSpPr>
+          <p:cNvPr id="5" name="Espaço Reservado para Conteúdo 4"/>
+          <p:cNvSpPr>
+            <a:spLocks noGrp="1"/>
+          </p:cNvSpPr>
+          <p:nvPr>
+            <p:ph idx="1"/>
+          </p:nvPr>
+        </p:nvSpPr>
+        <p:spPr/>
+        <p:txBody>
+          <a:bodyPr/>
+          <a:lstStyle/>
+          <a:p>
+            <a:endParaRPr lang="pt-BR"/>
+          </a:p>
+        </p:txBody>
+      </p:sp>
+      <p:pic>
+        <p:nvPicPr>
+          <p:cNvPr id="1026" name="Picture 2" descr="esultado de imagem para banco de dados .png"/>
+          <p:cNvPicPr>
+            <a:picLocks noChangeAspect="1" noChangeArrowheads="1"/>
+          </p:cNvPicPr>
+          <p:nvPr/>
+        </p:nvPicPr>
+        <p:blipFill>
+          <a:blip r:embed="rId2">
+            <a:extLst>
+              <a:ext uri="{28A0092B-C50C-407E-A947-70E740481C1C}">
+                <a14:useLocalDpi xmlns:a14="http://schemas.microsoft.com/office/drawing/2010/main" val="0"/>
+              </a:ext>
+            </a:extLst>
+          </a:blip>
+          <a:srcRect/>
+          <a:stretch>
+            <a:fillRect/>
+          </a:stretch>
+        </p:blipFill>
+        <p:spPr bwMode="auto">
+          <a:xfrm>
+            <a:off x="2348380" y="2998417"/>
+            <a:ext cx="852021" cy="852021"/>
+          </a:xfrm>
+          <a:prstGeom prst="rect">
+            <a:avLst/>
+          </a:prstGeom>
+          <a:noFill/>
+          <a:extLst>
+            <a:ext uri="{909E8E84-426E-40DD-AFC4-6F175D3DCCD1}">
+              <a14:hiddenFill xmlns:a14="http://schemas.microsoft.com/office/drawing/2010/main">
+                <a:solidFill>
+                  <a:srgbClr val="FFFFFF"/>
+                </a:solidFill>
+              </a14:hiddenFill>
+            </a:ext>
+          </a:extLst>
+        </p:spPr>
+      </p:pic>
     </p:spTree>
     <p:extLst>
       <p:ext uri="{BB962C8B-B14F-4D97-AF65-F5344CB8AC3E}">
-        <p14:creationId xmlns:p14="http://schemas.microsoft.com/office/powerpoint/2010/main" val="1714140654"/>
+        <p14:creationId xmlns:p14="http://schemas.microsoft.com/office/powerpoint/2010/main" val="1640824066"/>
       </p:ext>
     </p:extLst>
   </p:cSld>
@@ -5035,12 +4875,7 @@
             <p:ph type="title"/>
           </p:nvPr>
         </p:nvSpPr>
-        <p:spPr>
-          <a:xfrm>
-            <a:off x="252919" y="1123837"/>
-            <a:ext cx="3068350" cy="4601183"/>
-          </a:xfrm>
-        </p:spPr>
+        <p:spPr/>
         <p:txBody>
           <a:bodyPr/>
           <a:lstStyle/>
@@ -5051,7 +4886,7 @@
                 <a:ea typeface="Arial" charset="0"/>
                 <a:cs typeface="Arial" charset="0"/>
               </a:rPr>
-              <a:t>Dependências</a:t>
+              <a:t>REST</a:t>
             </a:r>
             <a:endParaRPr lang="pt-BR" dirty="0">
               <a:latin typeface="Arial" charset="0"/>
@@ -5061,9 +4896,102 @@
           </a:p>
         </p:txBody>
       </p:sp>
+      <p:sp>
+        <p:nvSpPr>
+          <p:cNvPr id="10" name="Título 1"/>
+          <p:cNvSpPr txBox="1">
+            <a:spLocks/>
+          </p:cNvSpPr>
+          <p:nvPr/>
+        </p:nvSpPr>
+        <p:spPr>
+          <a:xfrm>
+            <a:off x="7672548" y="4183117"/>
+            <a:ext cx="2947482" cy="2463110"/>
+          </a:xfrm>
+          <a:prstGeom prst="rect">
+            <a:avLst/>
+          </a:prstGeom>
+        </p:spPr>
+        <p:txBody>
+          <a:bodyPr vert="horz" lIns="91440" tIns="45720" rIns="91440" bIns="45720" rtlCol="0" anchor="ctr">
+            <a:normAutofit/>
+          </a:bodyPr>
+          <a:lstStyle>
+            <a:lvl1pPr algn="l" defTabSz="914400" rtl="0" eaLnBrk="1" latinLnBrk="0" hangingPunct="1">
+              <a:lnSpc>
+                <a:spcPct val="90000"/>
+              </a:lnSpc>
+              <a:spcBef>
+                <a:spcPct val="0"/>
+              </a:spcBef>
+              <a:buNone/>
+              <a:defRPr sz="3600" kern="1200" spc="-60" baseline="0">
+                <a:solidFill>
+                  <a:srgbClr val="FFFFFF"/>
+                </a:solidFill>
+                <a:latin typeface="+mj-lt"/>
+                <a:ea typeface="+mj-ea"/>
+                <a:cs typeface="+mj-cs"/>
+              </a:defRPr>
+            </a:lvl1pPr>
+          </a:lstStyle>
+          <a:p>
+            <a:r>
+              <a:rPr lang="pt-BR" dirty="0" smtClean="0">
+                <a:latin typeface="Arial" charset="0"/>
+                <a:ea typeface="Arial" charset="0"/>
+                <a:cs typeface="Arial" charset="0"/>
+              </a:rPr>
+              <a:t>package.json</a:t>
+            </a:r>
+            <a:endParaRPr lang="pt-BR" dirty="0">
+              <a:latin typeface="Arial" charset="0"/>
+              <a:ea typeface="Arial" charset="0"/>
+              <a:cs typeface="Arial" charset="0"/>
+            </a:endParaRPr>
+          </a:p>
+        </p:txBody>
+      </p:sp>
+      <p:sp>
+        <p:nvSpPr>
+          <p:cNvPr id="3" name="Espaço Reservado para Conteúdo 2"/>
+          <p:cNvSpPr>
+            <a:spLocks noGrp="1"/>
+          </p:cNvSpPr>
+          <p:nvPr>
+            <p:ph idx="1"/>
+          </p:nvPr>
+        </p:nvSpPr>
+        <p:spPr/>
+        <p:txBody>
+          <a:bodyPr/>
+          <a:lstStyle/>
+          <a:p>
+            <a:pPr marL="0" marR="0" lvl="0" indent="0" defTabSz="914400" eaLnBrk="1" fontAlgn="auto" latinLnBrk="0" hangingPunct="1">
+              <a:lnSpc>
+                <a:spcPct val="100000"/>
+              </a:lnSpc>
+              <a:spcBef>
+                <a:spcPts val="0"/>
+              </a:spcBef>
+              <a:spcAft>
+                <a:spcPts val="0"/>
+              </a:spcAft>
+              <a:buClrTx/>
+              <a:buSzTx/>
+              <a:buFontTx/>
+              <a:buNone/>
+              <a:tabLst/>
+              <a:defRPr/>
+            </a:pPr>
+            <a:endParaRPr lang="pt-BR" dirty="0"/>
+          </a:p>
+        </p:txBody>
+      </p:sp>
       <p:pic>
         <p:nvPicPr>
-          <p:cNvPr id="7170" name="Picture 2" descr="esultado de imagem para devdependencies image png"/>
+          <p:cNvPr id="3074" name="Picture 2" descr="esultado de imagem para json .png"/>
           <p:cNvPicPr>
             <a:picLocks noChangeAspect="1" noChangeArrowheads="1"/>
           </p:cNvPicPr>
@@ -5084,8 +5012,8 @@
         </p:blipFill>
         <p:spPr bwMode="auto">
           <a:xfrm>
-            <a:off x="807008" y="3794233"/>
-            <a:ext cx="1578843" cy="1578843"/>
+            <a:off x="1318163" y="2286376"/>
+            <a:ext cx="2276104" cy="2276104"/>
           </a:xfrm>
           <a:prstGeom prst="rect">
             <a:avLst/>
@@ -5102,655 +5030,23 @@
           </a:extLst>
         </p:spPr>
       </p:pic>
-      <p:sp>
-        <p:nvSpPr>
-          <p:cNvPr id="5" name="Espaço Reservado para Conteúdo 2"/>
-          <p:cNvSpPr txBox="1">
-            <a:spLocks/>
-          </p:cNvSpPr>
-          <p:nvPr/>
-        </p:nvSpPr>
-        <p:spPr>
-          <a:xfrm>
-            <a:off x="4021668" y="1016508"/>
-            <a:ext cx="7315200" cy="5120640"/>
-          </a:xfrm>
-          <a:prstGeom prst="rect">
-            <a:avLst/>
-          </a:prstGeom>
-        </p:spPr>
-        <p:txBody>
-          <a:bodyPr vert="horz" lIns="91440" tIns="45720" rIns="91440" bIns="45720" rtlCol="0" anchor="ctr">
-            <a:normAutofit/>
-          </a:bodyPr>
-          <a:lstStyle>
-            <a:lvl1pPr marL="182880" indent="-182880" algn="l" defTabSz="914400" rtl="0" eaLnBrk="1" latinLnBrk="0" hangingPunct="1">
-              <a:lnSpc>
-                <a:spcPct val="90000"/>
-              </a:lnSpc>
-              <a:spcBef>
-                <a:spcPts val="1200"/>
-              </a:spcBef>
-              <a:buClr>
-                <a:schemeClr val="accent1"/>
-              </a:buClr>
-              <a:buFont typeface="Wingdings 2" pitchFamily="18" charset="2"/>
-              <a:buChar char=""/>
-              <a:defRPr sz="2000" kern="1200">
-                <a:solidFill>
-                  <a:schemeClr val="tx1">
-                    <a:lumMod val="65000"/>
-                    <a:lumOff val="35000"/>
-                  </a:schemeClr>
-                </a:solidFill>
-                <a:latin typeface="+mn-lt"/>
-                <a:ea typeface="+mn-ea"/>
-                <a:cs typeface="+mn-cs"/>
-              </a:defRPr>
-            </a:lvl1pPr>
-            <a:lvl2pPr marL="685800" indent="-182880" algn="l" defTabSz="914400" rtl="0" eaLnBrk="1" latinLnBrk="0" hangingPunct="1">
-              <a:lnSpc>
-                <a:spcPct val="90000"/>
-              </a:lnSpc>
-              <a:spcBef>
-                <a:spcPts val="250"/>
-              </a:spcBef>
-              <a:spcAft>
-                <a:spcPts val="250"/>
-              </a:spcAft>
-              <a:buClr>
-                <a:schemeClr val="accent1"/>
-              </a:buClr>
-              <a:buFont typeface="Wingdings 2" pitchFamily="18" charset="2"/>
-              <a:buChar char=""/>
-              <a:defRPr sz="1800" kern="1200">
-                <a:solidFill>
-                  <a:schemeClr val="tx1">
-                    <a:lumMod val="65000"/>
-                    <a:lumOff val="35000"/>
-                  </a:schemeClr>
-                </a:solidFill>
-                <a:latin typeface="+mn-lt"/>
-                <a:ea typeface="+mn-ea"/>
-                <a:cs typeface="+mn-cs"/>
-              </a:defRPr>
-            </a:lvl2pPr>
-            <a:lvl3pPr marL="1143000" indent="-182880" algn="l" defTabSz="914400" rtl="0" eaLnBrk="1" latinLnBrk="0" hangingPunct="1">
-              <a:lnSpc>
-                <a:spcPct val="90000"/>
-              </a:lnSpc>
-              <a:spcBef>
-                <a:spcPts val="250"/>
-              </a:spcBef>
-              <a:spcAft>
-                <a:spcPts val="250"/>
-              </a:spcAft>
-              <a:buClr>
-                <a:schemeClr val="accent1"/>
-              </a:buClr>
-              <a:buFont typeface="Wingdings 2" pitchFamily="18" charset="2"/>
-              <a:buChar char=""/>
-              <a:defRPr sz="1600" kern="1200">
-                <a:solidFill>
-                  <a:schemeClr val="tx1">
-                    <a:lumMod val="65000"/>
-                    <a:lumOff val="35000"/>
-                  </a:schemeClr>
-                </a:solidFill>
-                <a:latin typeface="+mn-lt"/>
-                <a:ea typeface="+mn-ea"/>
-                <a:cs typeface="+mn-cs"/>
-              </a:defRPr>
-            </a:lvl3pPr>
-            <a:lvl4pPr marL="1600200" indent="-182880" algn="l" defTabSz="914400" rtl="0" eaLnBrk="1" latinLnBrk="0" hangingPunct="1">
-              <a:lnSpc>
-                <a:spcPct val="90000"/>
-              </a:lnSpc>
-              <a:spcBef>
-                <a:spcPts val="250"/>
-              </a:spcBef>
-              <a:spcAft>
-                <a:spcPts val="250"/>
-              </a:spcAft>
-              <a:buClr>
-                <a:schemeClr val="accent1"/>
-              </a:buClr>
-              <a:buFont typeface="Wingdings 2" pitchFamily="18" charset="2"/>
-              <a:buChar char=""/>
-              <a:defRPr sz="1400" kern="1200">
-                <a:solidFill>
-                  <a:schemeClr val="tx1">
-                    <a:lumMod val="65000"/>
-                    <a:lumOff val="35000"/>
-                  </a:schemeClr>
-                </a:solidFill>
-                <a:latin typeface="+mn-lt"/>
-                <a:ea typeface="+mn-ea"/>
-                <a:cs typeface="+mn-cs"/>
-              </a:defRPr>
-            </a:lvl4pPr>
-            <a:lvl5pPr marL="2057400" indent="-182880" algn="l" defTabSz="914400" rtl="0" eaLnBrk="1" latinLnBrk="0" hangingPunct="1">
-              <a:lnSpc>
-                <a:spcPct val="90000"/>
-              </a:lnSpc>
-              <a:spcBef>
-                <a:spcPts val="250"/>
-              </a:spcBef>
-              <a:spcAft>
-                <a:spcPts val="250"/>
-              </a:spcAft>
-              <a:buClr>
-                <a:schemeClr val="accent1"/>
-              </a:buClr>
-              <a:buFont typeface="Wingdings 2" pitchFamily="18" charset="2"/>
-              <a:buChar char=""/>
-              <a:defRPr sz="1400" kern="1200">
-                <a:solidFill>
-                  <a:schemeClr val="tx1">
-                    <a:lumMod val="65000"/>
-                    <a:lumOff val="35000"/>
-                  </a:schemeClr>
-                </a:solidFill>
-                <a:latin typeface="+mn-lt"/>
-                <a:ea typeface="+mn-ea"/>
-                <a:cs typeface="+mn-cs"/>
-              </a:defRPr>
-            </a:lvl5pPr>
-            <a:lvl6pPr marL="2514600" indent="-228600" algn="l" defTabSz="914400" rtl="0" eaLnBrk="1" latinLnBrk="0" hangingPunct="1">
-              <a:lnSpc>
-                <a:spcPct val="90000"/>
-              </a:lnSpc>
-              <a:spcBef>
-                <a:spcPts val="250"/>
-              </a:spcBef>
-              <a:spcAft>
-                <a:spcPts val="250"/>
-              </a:spcAft>
-              <a:buClr>
-                <a:schemeClr val="accent1"/>
-              </a:buClr>
-              <a:buFont typeface="Wingdings 2" pitchFamily="18" charset="2"/>
-              <a:buChar char=""/>
-              <a:defRPr sz="1400" kern="1200">
-                <a:solidFill>
-                  <a:schemeClr val="tx1">
-                    <a:lumMod val="65000"/>
-                    <a:lumOff val="35000"/>
-                  </a:schemeClr>
-                </a:solidFill>
-                <a:latin typeface="+mn-lt"/>
-                <a:ea typeface="+mn-ea"/>
-                <a:cs typeface="+mn-cs"/>
-              </a:defRPr>
-            </a:lvl6pPr>
-            <a:lvl7pPr marL="2971800" indent="-228600" algn="l" defTabSz="914400" rtl="0" eaLnBrk="1" latinLnBrk="0" hangingPunct="1">
-              <a:lnSpc>
-                <a:spcPct val="90000"/>
-              </a:lnSpc>
-              <a:spcBef>
-                <a:spcPts val="250"/>
-              </a:spcBef>
-              <a:spcAft>
-                <a:spcPts val="250"/>
-              </a:spcAft>
-              <a:buClr>
-                <a:schemeClr val="accent1"/>
-              </a:buClr>
-              <a:buFont typeface="Wingdings 2" pitchFamily="18" charset="2"/>
-              <a:buChar char=""/>
-              <a:defRPr sz="1400" kern="1200">
-                <a:solidFill>
-                  <a:schemeClr val="tx1">
-                    <a:lumMod val="65000"/>
-                    <a:lumOff val="35000"/>
-                  </a:schemeClr>
-                </a:solidFill>
-                <a:latin typeface="+mn-lt"/>
-                <a:ea typeface="+mn-ea"/>
-                <a:cs typeface="+mn-cs"/>
-              </a:defRPr>
-            </a:lvl7pPr>
-            <a:lvl8pPr marL="3429000" indent="-228600" algn="l" defTabSz="914400" rtl="0" eaLnBrk="1" latinLnBrk="0" hangingPunct="1">
-              <a:lnSpc>
-                <a:spcPct val="90000"/>
-              </a:lnSpc>
-              <a:spcBef>
-                <a:spcPts val="250"/>
-              </a:spcBef>
-              <a:spcAft>
-                <a:spcPts val="250"/>
-              </a:spcAft>
-              <a:buClr>
-                <a:schemeClr val="accent1"/>
-              </a:buClr>
-              <a:buFont typeface="Wingdings 2" pitchFamily="18" charset="2"/>
-              <a:buChar char=""/>
-              <a:defRPr sz="1400" kern="1200">
-                <a:solidFill>
-                  <a:schemeClr val="tx1">
-                    <a:lumMod val="65000"/>
-                    <a:lumOff val="35000"/>
-                  </a:schemeClr>
-                </a:solidFill>
-                <a:latin typeface="+mn-lt"/>
-                <a:ea typeface="+mn-ea"/>
-                <a:cs typeface="+mn-cs"/>
-              </a:defRPr>
-            </a:lvl8pPr>
-            <a:lvl9pPr marL="3886200" indent="-228600" algn="l" defTabSz="914400" rtl="0" eaLnBrk="1" latinLnBrk="0" hangingPunct="1">
-              <a:lnSpc>
-                <a:spcPct val="90000"/>
-              </a:lnSpc>
-              <a:spcBef>
-                <a:spcPts val="250"/>
-              </a:spcBef>
-              <a:spcAft>
-                <a:spcPts val="250"/>
-              </a:spcAft>
-              <a:buClr>
-                <a:schemeClr val="accent1"/>
-              </a:buClr>
-              <a:buFont typeface="Wingdings 2" pitchFamily="18" charset="2"/>
-              <a:buChar char=""/>
-              <a:defRPr sz="1400" kern="1200">
-                <a:solidFill>
-                  <a:schemeClr val="tx1">
-                    <a:lumMod val="65000"/>
-                    <a:lumOff val="35000"/>
-                  </a:schemeClr>
-                </a:solidFill>
-                <a:latin typeface="+mn-lt"/>
-                <a:ea typeface="+mn-ea"/>
-                <a:cs typeface="+mn-cs"/>
-              </a:defRPr>
-            </a:lvl9pPr>
-          </a:lstStyle>
-          <a:p>
-            <a:pPr>
-              <a:buFont typeface="Arial" charset="0"/>
-              <a:buChar char="•"/>
-            </a:pPr>
-            <a:r>
-              <a:rPr lang="pt-BR" dirty="0" err="1" smtClean="0"/>
-              <a:t>Bootstrap</a:t>
-            </a:r>
-            <a:endParaRPr lang="pt-BR" dirty="0" smtClean="0"/>
-          </a:p>
-          <a:p>
-            <a:pPr>
-              <a:buFont typeface="Arial" charset="0"/>
-              <a:buChar char="•"/>
-            </a:pPr>
-            <a:r>
-              <a:rPr lang="pt-BR" dirty="0" err="1" smtClean="0"/>
-              <a:t>GoogleFonts</a:t>
-            </a:r>
-            <a:endParaRPr lang="pt-BR" dirty="0" smtClean="0"/>
-          </a:p>
-          <a:p>
-            <a:pPr>
-              <a:buFont typeface="Arial" charset="0"/>
-              <a:buChar char="•"/>
-            </a:pPr>
-            <a:r>
-              <a:rPr lang="pt-BR" dirty="0" err="1" smtClean="0"/>
-              <a:t>Jquery</a:t>
-            </a:r>
-            <a:endParaRPr lang="pt-BR" dirty="0" smtClean="0"/>
-          </a:p>
-          <a:p>
-            <a:pPr>
-              <a:buFont typeface="Arial" charset="0"/>
-              <a:buChar char="•"/>
-            </a:pPr>
-            <a:r>
-              <a:rPr lang="pt-BR" dirty="0" err="1" smtClean="0"/>
-              <a:t>Lax</a:t>
-            </a:r>
-            <a:endParaRPr lang="pt-BR" dirty="0" smtClean="0"/>
-          </a:p>
-          <a:p>
-            <a:pPr>
-              <a:buFont typeface="Arial" charset="0"/>
-              <a:buChar char="•"/>
-            </a:pPr>
-            <a:r>
-              <a:rPr lang="pt-BR" dirty="0" smtClean="0"/>
-              <a:t>Popper</a:t>
-            </a:r>
-          </a:p>
-        </p:txBody>
-      </p:sp>
-      <p:sp>
-        <p:nvSpPr>
-          <p:cNvPr id="6" name="Espaço Reservado para Conteúdo 2"/>
-          <p:cNvSpPr txBox="1">
-            <a:spLocks/>
-          </p:cNvSpPr>
-          <p:nvPr/>
-        </p:nvSpPr>
-        <p:spPr>
-          <a:xfrm>
-            <a:off x="6843693" y="1016508"/>
-            <a:ext cx="7315200" cy="5120640"/>
-          </a:xfrm>
-          <a:prstGeom prst="rect">
-            <a:avLst/>
-          </a:prstGeom>
-        </p:spPr>
-        <p:txBody>
-          <a:bodyPr vert="horz" lIns="91440" tIns="45720" rIns="91440" bIns="45720" rtlCol="0" anchor="ctr">
-            <a:normAutofit/>
-          </a:bodyPr>
-          <a:lstStyle>
-            <a:lvl1pPr marL="182880" indent="-182880" algn="l" defTabSz="914400" rtl="0" eaLnBrk="1" latinLnBrk="0" hangingPunct="1">
-              <a:lnSpc>
-                <a:spcPct val="90000"/>
-              </a:lnSpc>
-              <a:spcBef>
-                <a:spcPts val="1200"/>
-              </a:spcBef>
-              <a:buClr>
-                <a:schemeClr val="accent1"/>
-              </a:buClr>
-              <a:buFont typeface="Wingdings 2" pitchFamily="18" charset="2"/>
-              <a:buChar char=""/>
-              <a:defRPr sz="2000" kern="1200">
-                <a:solidFill>
-                  <a:schemeClr val="tx1">
-                    <a:lumMod val="65000"/>
-                    <a:lumOff val="35000"/>
-                  </a:schemeClr>
-                </a:solidFill>
-                <a:latin typeface="+mn-lt"/>
-                <a:ea typeface="+mn-ea"/>
-                <a:cs typeface="+mn-cs"/>
-              </a:defRPr>
-            </a:lvl1pPr>
-            <a:lvl2pPr marL="685800" indent="-182880" algn="l" defTabSz="914400" rtl="0" eaLnBrk="1" latinLnBrk="0" hangingPunct="1">
-              <a:lnSpc>
-                <a:spcPct val="90000"/>
-              </a:lnSpc>
-              <a:spcBef>
-                <a:spcPts val="250"/>
-              </a:spcBef>
-              <a:spcAft>
-                <a:spcPts val="250"/>
-              </a:spcAft>
-              <a:buClr>
-                <a:schemeClr val="accent1"/>
-              </a:buClr>
-              <a:buFont typeface="Wingdings 2" pitchFamily="18" charset="2"/>
-              <a:buChar char=""/>
-              <a:defRPr sz="1800" kern="1200">
-                <a:solidFill>
-                  <a:schemeClr val="tx1">
-                    <a:lumMod val="65000"/>
-                    <a:lumOff val="35000"/>
-                  </a:schemeClr>
-                </a:solidFill>
-                <a:latin typeface="+mn-lt"/>
-                <a:ea typeface="+mn-ea"/>
-                <a:cs typeface="+mn-cs"/>
-              </a:defRPr>
-            </a:lvl2pPr>
-            <a:lvl3pPr marL="1143000" indent="-182880" algn="l" defTabSz="914400" rtl="0" eaLnBrk="1" latinLnBrk="0" hangingPunct="1">
-              <a:lnSpc>
-                <a:spcPct val="90000"/>
-              </a:lnSpc>
-              <a:spcBef>
-                <a:spcPts val="250"/>
-              </a:spcBef>
-              <a:spcAft>
-                <a:spcPts val="250"/>
-              </a:spcAft>
-              <a:buClr>
-                <a:schemeClr val="accent1"/>
-              </a:buClr>
-              <a:buFont typeface="Wingdings 2" pitchFamily="18" charset="2"/>
-              <a:buChar char=""/>
-              <a:defRPr sz="1600" kern="1200">
-                <a:solidFill>
-                  <a:schemeClr val="tx1">
-                    <a:lumMod val="65000"/>
-                    <a:lumOff val="35000"/>
-                  </a:schemeClr>
-                </a:solidFill>
-                <a:latin typeface="+mn-lt"/>
-                <a:ea typeface="+mn-ea"/>
-                <a:cs typeface="+mn-cs"/>
-              </a:defRPr>
-            </a:lvl3pPr>
-            <a:lvl4pPr marL="1600200" indent="-182880" algn="l" defTabSz="914400" rtl="0" eaLnBrk="1" latinLnBrk="0" hangingPunct="1">
-              <a:lnSpc>
-                <a:spcPct val="90000"/>
-              </a:lnSpc>
-              <a:spcBef>
-                <a:spcPts val="250"/>
-              </a:spcBef>
-              <a:spcAft>
-                <a:spcPts val="250"/>
-              </a:spcAft>
-              <a:buClr>
-                <a:schemeClr val="accent1"/>
-              </a:buClr>
-              <a:buFont typeface="Wingdings 2" pitchFamily="18" charset="2"/>
-              <a:buChar char=""/>
-              <a:defRPr sz="1400" kern="1200">
-                <a:solidFill>
-                  <a:schemeClr val="tx1">
-                    <a:lumMod val="65000"/>
-                    <a:lumOff val="35000"/>
-                  </a:schemeClr>
-                </a:solidFill>
-                <a:latin typeface="+mn-lt"/>
-                <a:ea typeface="+mn-ea"/>
-                <a:cs typeface="+mn-cs"/>
-              </a:defRPr>
-            </a:lvl4pPr>
-            <a:lvl5pPr marL="2057400" indent="-182880" algn="l" defTabSz="914400" rtl="0" eaLnBrk="1" latinLnBrk="0" hangingPunct="1">
-              <a:lnSpc>
-                <a:spcPct val="90000"/>
-              </a:lnSpc>
-              <a:spcBef>
-                <a:spcPts val="250"/>
-              </a:spcBef>
-              <a:spcAft>
-                <a:spcPts val="250"/>
-              </a:spcAft>
-              <a:buClr>
-                <a:schemeClr val="accent1"/>
-              </a:buClr>
-              <a:buFont typeface="Wingdings 2" pitchFamily="18" charset="2"/>
-              <a:buChar char=""/>
-              <a:defRPr sz="1400" kern="1200">
-                <a:solidFill>
-                  <a:schemeClr val="tx1">
-                    <a:lumMod val="65000"/>
-                    <a:lumOff val="35000"/>
-                  </a:schemeClr>
-                </a:solidFill>
-                <a:latin typeface="+mn-lt"/>
-                <a:ea typeface="+mn-ea"/>
-                <a:cs typeface="+mn-cs"/>
-              </a:defRPr>
-            </a:lvl5pPr>
-            <a:lvl6pPr marL="2514600" indent="-228600" algn="l" defTabSz="914400" rtl="0" eaLnBrk="1" latinLnBrk="0" hangingPunct="1">
-              <a:lnSpc>
-                <a:spcPct val="90000"/>
-              </a:lnSpc>
-              <a:spcBef>
-                <a:spcPts val="250"/>
-              </a:spcBef>
-              <a:spcAft>
-                <a:spcPts val="250"/>
-              </a:spcAft>
-              <a:buClr>
-                <a:schemeClr val="accent1"/>
-              </a:buClr>
-              <a:buFont typeface="Wingdings 2" pitchFamily="18" charset="2"/>
-              <a:buChar char=""/>
-              <a:defRPr sz="1400" kern="1200">
-                <a:solidFill>
-                  <a:schemeClr val="tx1">
-                    <a:lumMod val="65000"/>
-                    <a:lumOff val="35000"/>
-                  </a:schemeClr>
-                </a:solidFill>
-                <a:latin typeface="+mn-lt"/>
-                <a:ea typeface="+mn-ea"/>
-                <a:cs typeface="+mn-cs"/>
-              </a:defRPr>
-            </a:lvl6pPr>
-            <a:lvl7pPr marL="2971800" indent="-228600" algn="l" defTabSz="914400" rtl="0" eaLnBrk="1" latinLnBrk="0" hangingPunct="1">
-              <a:lnSpc>
-                <a:spcPct val="90000"/>
-              </a:lnSpc>
-              <a:spcBef>
-                <a:spcPts val="250"/>
-              </a:spcBef>
-              <a:spcAft>
-                <a:spcPts val="250"/>
-              </a:spcAft>
-              <a:buClr>
-                <a:schemeClr val="accent1"/>
-              </a:buClr>
-              <a:buFont typeface="Wingdings 2" pitchFamily="18" charset="2"/>
-              <a:buChar char=""/>
-              <a:defRPr sz="1400" kern="1200">
-                <a:solidFill>
-                  <a:schemeClr val="tx1">
-                    <a:lumMod val="65000"/>
-                    <a:lumOff val="35000"/>
-                  </a:schemeClr>
-                </a:solidFill>
-                <a:latin typeface="+mn-lt"/>
-                <a:ea typeface="+mn-ea"/>
-                <a:cs typeface="+mn-cs"/>
-              </a:defRPr>
-            </a:lvl7pPr>
-            <a:lvl8pPr marL="3429000" indent="-228600" algn="l" defTabSz="914400" rtl="0" eaLnBrk="1" latinLnBrk="0" hangingPunct="1">
-              <a:lnSpc>
-                <a:spcPct val="90000"/>
-              </a:lnSpc>
-              <a:spcBef>
-                <a:spcPts val="250"/>
-              </a:spcBef>
-              <a:spcAft>
-                <a:spcPts val="250"/>
-              </a:spcAft>
-              <a:buClr>
-                <a:schemeClr val="accent1"/>
-              </a:buClr>
-              <a:buFont typeface="Wingdings 2" pitchFamily="18" charset="2"/>
-              <a:buChar char=""/>
-              <a:defRPr sz="1400" kern="1200">
-                <a:solidFill>
-                  <a:schemeClr val="tx1">
-                    <a:lumMod val="65000"/>
-                    <a:lumOff val="35000"/>
-                  </a:schemeClr>
-                </a:solidFill>
-                <a:latin typeface="+mn-lt"/>
-                <a:ea typeface="+mn-ea"/>
-                <a:cs typeface="+mn-cs"/>
-              </a:defRPr>
-            </a:lvl8pPr>
-            <a:lvl9pPr marL="3886200" indent="-228600" algn="l" defTabSz="914400" rtl="0" eaLnBrk="1" latinLnBrk="0" hangingPunct="1">
-              <a:lnSpc>
-                <a:spcPct val="90000"/>
-              </a:lnSpc>
-              <a:spcBef>
-                <a:spcPts val="250"/>
-              </a:spcBef>
-              <a:spcAft>
-                <a:spcPts val="250"/>
-              </a:spcAft>
-              <a:buClr>
-                <a:schemeClr val="accent1"/>
-              </a:buClr>
-              <a:buFont typeface="Wingdings 2" pitchFamily="18" charset="2"/>
-              <a:buChar char=""/>
-              <a:defRPr sz="1400" kern="1200">
-                <a:solidFill>
-                  <a:schemeClr val="tx1">
-                    <a:lumMod val="65000"/>
-                    <a:lumOff val="35000"/>
-                  </a:schemeClr>
-                </a:solidFill>
-                <a:latin typeface="+mn-lt"/>
-                <a:ea typeface="+mn-ea"/>
-                <a:cs typeface="+mn-cs"/>
-              </a:defRPr>
-            </a:lvl9pPr>
-          </a:lstStyle>
-          <a:p>
-            <a:pPr>
-              <a:buFont typeface="Arial" charset="0"/>
-              <a:buChar char="•"/>
-            </a:pPr>
-            <a:r>
-              <a:rPr lang="pt-BR" dirty="0" err="1" smtClean="0"/>
-              <a:t>Gulp</a:t>
-            </a:r>
-            <a:endParaRPr lang="pt-BR" dirty="0" smtClean="0"/>
-          </a:p>
-          <a:p>
-            <a:pPr>
-              <a:buFont typeface="Arial" charset="0"/>
-              <a:buChar char="•"/>
-            </a:pPr>
-            <a:r>
-              <a:rPr lang="pt-BR" dirty="0" err="1" smtClean="0"/>
-              <a:t>Gulp-Concat</a:t>
-            </a:r>
-            <a:endParaRPr lang="pt-BR" dirty="0" smtClean="0"/>
-          </a:p>
-          <a:p>
-            <a:pPr>
-              <a:buFont typeface="Arial" charset="0"/>
-              <a:buChar char="•"/>
-            </a:pPr>
-            <a:r>
-              <a:rPr lang="pt-BR" dirty="0" err="1" smtClean="0"/>
-              <a:t>Gulp-Rename</a:t>
-            </a:r>
-            <a:endParaRPr lang="pt-BR" dirty="0" smtClean="0"/>
-          </a:p>
-          <a:p>
-            <a:pPr>
-              <a:buFont typeface="Arial" charset="0"/>
-              <a:buChar char="•"/>
-            </a:pPr>
-            <a:r>
-              <a:rPr lang="pt-BR" dirty="0" err="1" smtClean="0"/>
-              <a:t>Gulp-Uglify</a:t>
-            </a:r>
-            <a:endParaRPr lang="pt-BR" dirty="0" smtClean="0"/>
-          </a:p>
-          <a:p>
-            <a:pPr>
-              <a:buFont typeface="Arial" charset="0"/>
-              <a:buChar char="•"/>
-            </a:pPr>
-            <a:r>
-              <a:rPr lang="pt-BR" dirty="0" err="1" smtClean="0"/>
-              <a:t>Gulp-Watch</a:t>
-            </a:r>
-            <a:endParaRPr lang="pt-BR" dirty="0" smtClean="0"/>
-          </a:p>
-        </p:txBody>
-      </p:sp>
     </p:spTree>
     <p:extLst>
       <p:ext uri="{BB962C8B-B14F-4D97-AF65-F5344CB8AC3E}">
-        <p14:creationId xmlns:p14="http://schemas.microsoft.com/office/powerpoint/2010/main" val="1257574772"/>
+        <p14:creationId xmlns:p14="http://schemas.microsoft.com/office/powerpoint/2010/main" val="446558313"/>
       </p:ext>
     </p:extLst>
   </p:cSld>
   <p:clrMapOvr>
     <a:masterClrMapping/>
   </p:clrMapOvr>
+  <p:timing>
+    <p:tnLst>
+      <p:par>
+        <p:cTn id="1" dur="indefinite" restart="never" nodeType="tmRoot"/>
+      </p:par>
+    </p:tnLst>
+  </p:timing>
 </p:sld>
 </file>
 
@@ -5787,12 +5083,12 @@
           <a:lstStyle/>
           <a:p>
             <a:r>
-              <a:rPr lang="pt-BR" dirty="0" smtClean="0">
+              <a:rPr lang="pt-BR" dirty="0" err="1" smtClean="0">
                 <a:latin typeface="Arial" charset="0"/>
                 <a:ea typeface="Arial" charset="0"/>
                 <a:cs typeface="Arial" charset="0"/>
               </a:rPr>
-              <a:t>GULP</a:t>
+              <a:t>PostMan</a:t>
             </a:r>
             <a:endParaRPr lang="pt-BR" dirty="0">
               <a:latin typeface="Arial" charset="0"/>
@@ -5802,88 +5098,17 @@
           </a:p>
         </p:txBody>
       </p:sp>
-      <p:pic>
-        <p:nvPicPr>
-          <p:cNvPr id="8194" name="Picture 2" descr="esultado de imagem para GULP image png"/>
-          <p:cNvPicPr>
-            <a:picLocks noChangeAspect="1" noChangeArrowheads="1"/>
-          </p:cNvPicPr>
+      <p:sp>
+        <p:nvSpPr>
+          <p:cNvPr id="10" name="Título 1"/>
+          <p:cNvSpPr txBox="1">
+            <a:spLocks/>
+          </p:cNvSpPr>
           <p:nvPr/>
-        </p:nvPicPr>
-        <p:blipFill>
-          <a:blip r:embed="rId2">
-            <a:extLst>
-              <a:ext uri="{28A0092B-C50C-407E-A947-70E740481C1C}">
-                <a14:useLocalDpi xmlns:a14="http://schemas.microsoft.com/office/drawing/2010/main" val="0"/>
-              </a:ext>
-            </a:extLst>
-          </a:blip>
-          <a:srcRect/>
-          <a:stretch>
-            <a:fillRect/>
-          </a:stretch>
-        </p:blipFill>
-        <p:spPr bwMode="auto">
-          <a:xfrm>
-            <a:off x="1072055" y="1849821"/>
-            <a:ext cx="2617076" cy="2617076"/>
-          </a:xfrm>
-          <a:prstGeom prst="rect">
-            <a:avLst/>
-          </a:prstGeom>
-          <a:noFill/>
-          <a:extLst>
-            <a:ext uri="{909E8E84-426E-40DD-AFC4-6F175D3DCCD1}">
-              <a14:hiddenFill xmlns:a14="http://schemas.microsoft.com/office/drawing/2010/main">
-                <a:solidFill>
-                  <a:srgbClr val="FFFFFF"/>
-                </a:solidFill>
-              </a14:hiddenFill>
-            </a:ext>
-          </a:extLst>
-        </p:spPr>
-      </p:pic>
-      <p:pic>
-        <p:nvPicPr>
-          <p:cNvPr id="3" name="Imagem 2"/>
-          <p:cNvPicPr>
-            <a:picLocks noChangeAspect="1"/>
-          </p:cNvPicPr>
-          <p:nvPr/>
-        </p:nvPicPr>
-        <p:blipFill>
-          <a:blip r:embed="rId3">
-            <a:extLst>
-              <a:ext uri="{28A0092B-C50C-407E-A947-70E740481C1C}">
-                <a14:useLocalDpi xmlns:a14="http://schemas.microsoft.com/office/drawing/2010/main" val="0"/>
-              </a:ext>
-            </a:extLst>
-          </a:blip>
-          <a:stretch>
-            <a:fillRect/>
-          </a:stretch>
-        </p:blipFill>
+        </p:nvSpPr>
         <p:spPr>
           <a:xfrm>
-            <a:off x="3921672" y="293878"/>
-            <a:ext cx="7543800" cy="6261100"/>
-          </a:xfrm>
-          <a:prstGeom prst="rect">
-            <a:avLst/>
-          </a:prstGeom>
-        </p:spPr>
-      </p:pic>
-      <p:sp>
-        <p:nvSpPr>
-          <p:cNvPr id="8" name="Título 1"/>
-          <p:cNvSpPr txBox="1">
-            <a:spLocks/>
-          </p:cNvSpPr>
-          <p:nvPr/>
-        </p:nvSpPr>
-        <p:spPr>
-          <a:xfrm>
-            <a:off x="8513374" y="4866289"/>
+            <a:off x="7672548" y="4183117"/>
             <a:ext cx="2947482" cy="2463110"/>
           </a:xfrm>
           <a:prstGeom prst="rect">
@@ -5915,12 +5140,12 @@
           </a:lstStyle>
           <a:p>
             <a:r>
-              <a:rPr lang="pt-BR" dirty="0" err="1" smtClean="0">
+              <a:rPr lang="pt-BR" dirty="0" smtClean="0">
                 <a:latin typeface="Arial" charset="0"/>
                 <a:ea typeface="Arial" charset="0"/>
                 <a:cs typeface="Arial" charset="0"/>
               </a:rPr>
-              <a:t>gulpfile.js</a:t>
+              <a:t>package.json</a:t>
             </a:r>
             <a:endParaRPr lang="pt-BR" dirty="0">
               <a:latin typeface="Arial" charset="0"/>
@@ -5930,16 +5155,42 @@
           </a:p>
         </p:txBody>
       </p:sp>
+      <p:sp>
+        <p:nvSpPr>
+          <p:cNvPr id="3" name="Espaço Reservado para Conteúdo 2"/>
+          <p:cNvSpPr>
+            <a:spLocks noGrp="1"/>
+          </p:cNvSpPr>
+          <p:nvPr>
+            <p:ph idx="1"/>
+          </p:nvPr>
+        </p:nvSpPr>
+        <p:spPr/>
+        <p:txBody>
+          <a:bodyPr/>
+          <a:lstStyle/>
+          <a:p>
+            <a:endParaRPr lang="pt-BR"/>
+          </a:p>
+        </p:txBody>
+      </p:sp>
     </p:spTree>
     <p:extLst>
       <p:ext uri="{BB962C8B-B14F-4D97-AF65-F5344CB8AC3E}">
-        <p14:creationId xmlns:p14="http://schemas.microsoft.com/office/powerpoint/2010/main" val="1078745540"/>
+        <p14:creationId xmlns:p14="http://schemas.microsoft.com/office/powerpoint/2010/main" val="840308406"/>
       </p:ext>
     </p:extLst>
   </p:cSld>
   <p:clrMapOvr>
     <a:masterClrMapping/>
   </p:clrMapOvr>
+  <p:timing>
+    <p:tnLst>
+      <p:par>
+        <p:cTn id="1" dur="indefinite" restart="never" nodeType="tmRoot"/>
+      </p:par>
+    </p:tnLst>
+  </p:timing>
 </p:sld>
 </file>
 
@@ -5976,12 +5227,69 @@
           <a:lstStyle/>
           <a:p>
             <a:r>
+              <a:rPr lang="pt-BR" dirty="0" err="1" smtClean="0">
+                <a:latin typeface="Arial" charset="0"/>
+                <a:ea typeface="Arial" charset="0"/>
+                <a:cs typeface="Arial" charset="0"/>
+              </a:rPr>
+              <a:t>Collection</a:t>
+            </a:r>
+            <a:endParaRPr lang="pt-BR" dirty="0">
+              <a:latin typeface="Arial" charset="0"/>
+              <a:ea typeface="Arial" charset="0"/>
+              <a:cs typeface="Arial" charset="0"/>
+            </a:endParaRPr>
+          </a:p>
+        </p:txBody>
+      </p:sp>
+      <p:sp>
+        <p:nvSpPr>
+          <p:cNvPr id="10" name="Título 1"/>
+          <p:cNvSpPr txBox="1">
+            <a:spLocks/>
+          </p:cNvSpPr>
+          <p:nvPr/>
+        </p:nvSpPr>
+        <p:spPr>
+          <a:xfrm>
+            <a:off x="7672548" y="4183117"/>
+            <a:ext cx="2947482" cy="2463110"/>
+          </a:xfrm>
+          <a:prstGeom prst="rect">
+            <a:avLst/>
+          </a:prstGeom>
+        </p:spPr>
+        <p:txBody>
+          <a:bodyPr vert="horz" lIns="91440" tIns="45720" rIns="91440" bIns="45720" rtlCol="0" anchor="ctr">
+            <a:normAutofit/>
+          </a:bodyPr>
+          <a:lstStyle>
+            <a:lvl1pPr algn="l" defTabSz="914400" rtl="0" eaLnBrk="1" latinLnBrk="0" hangingPunct="1">
+              <a:lnSpc>
+                <a:spcPct val="90000"/>
+              </a:lnSpc>
+              <a:spcBef>
+                <a:spcPct val="0"/>
+              </a:spcBef>
+              <a:buNone/>
+              <a:defRPr sz="3600" kern="1200" spc="-60" baseline="0">
+                <a:solidFill>
+                  <a:srgbClr val="FFFFFF"/>
+                </a:solidFill>
+                <a:latin typeface="+mj-lt"/>
+                <a:ea typeface="+mj-ea"/>
+                <a:cs typeface="+mj-cs"/>
+              </a:defRPr>
+            </a:lvl1pPr>
+          </a:lstStyle>
+          <a:p>
+            <a:r>
               <a:rPr lang="pt-BR" dirty="0" smtClean="0">
                 <a:latin typeface="Arial" charset="0"/>
                 <a:ea typeface="Arial" charset="0"/>
                 <a:cs typeface="Arial" charset="0"/>
               </a:rPr>
-              <a:t>UX</a:t>
+              <a:t>package.json</a:t>
             </a:r>
             <a:endParaRPr lang="pt-BR" dirty="0">
               <a:latin typeface="Arial" charset="0"/>
@@ -5991,182 +5299,42 @@
           </a:p>
         </p:txBody>
       </p:sp>
-      <p:pic>
-        <p:nvPicPr>
-          <p:cNvPr id="9222" name="Picture 6" descr="esultado de imagem para ux image png"/>
-          <p:cNvPicPr>
-            <a:picLocks noChangeAspect="1" noChangeArrowheads="1"/>
-          </p:cNvPicPr>
-          <p:nvPr/>
-        </p:nvPicPr>
-        <p:blipFill>
-          <a:blip r:embed="rId2">
-            <a:duotone>
-              <a:schemeClr val="accent4">
-                <a:shade val="45000"/>
-                <a:satMod val="135000"/>
-              </a:schemeClr>
-              <a:prstClr val="white"/>
-            </a:duotone>
-            <a:alphaModFix/>
-            <a:extLst>
-              <a:ext uri="{BEBA8EAE-BF5A-486C-A8C5-ECC9F3942E4B}">
-                <a14:imgProps xmlns:a14="http://schemas.microsoft.com/office/drawing/2010/main">
-                  <a14:imgLayer r:embed="rId3">
-                    <a14:imgEffect>
-                      <a14:artisticCrisscrossEtching/>
-                    </a14:imgEffect>
-                    <a14:imgEffect>
-                      <a14:brightnessContrast bright="40000" contrast="40000"/>
-                    </a14:imgEffect>
-                  </a14:imgLayer>
-                </a14:imgProps>
-              </a:ext>
-              <a:ext uri="{28A0092B-C50C-407E-A947-70E740481C1C}">
-                <a14:useLocalDpi xmlns:a14="http://schemas.microsoft.com/office/drawing/2010/main" val="0"/>
-              </a:ext>
-            </a:extLst>
-          </a:blip>
-          <a:srcRect/>
-          <a:stretch>
-            <a:fillRect/>
-          </a:stretch>
-        </p:blipFill>
-        <p:spPr bwMode="auto">
-          <a:xfrm>
-            <a:off x="1150881" y="2378652"/>
-            <a:ext cx="2102070" cy="2102070"/>
-          </a:xfrm>
-          <a:prstGeom prst="rect">
-            <a:avLst/>
-          </a:prstGeom>
-          <a:noFill/>
-          <a:extLst>
-            <a:ext uri="{909E8E84-426E-40DD-AFC4-6F175D3DCCD1}">
-              <a14:hiddenFill xmlns:a14="http://schemas.microsoft.com/office/drawing/2010/main">
-                <a:solidFill>
-                  <a:srgbClr val="FFFFFF"/>
-                </a:solidFill>
-              </a14:hiddenFill>
-            </a:ext>
-          </a:extLst>
-        </p:spPr>
-      </p:pic>
-      <p:grpSp>
-        <p:nvGrpSpPr>
-          <p:cNvPr id="11" name="Grupo 10"/>
-          <p:cNvGrpSpPr/>
-          <p:nvPr/>
-        </p:nvGrpSpPr>
-        <p:grpSpPr>
-          <a:xfrm>
-            <a:off x="3520969" y="794353"/>
-            <a:ext cx="8198068" cy="5303491"/>
-            <a:chOff x="3520969" y="794353"/>
-            <a:chExt cx="8198068" cy="5303491"/>
-          </a:xfrm>
-        </p:grpSpPr>
-        <p:pic>
-          <p:nvPicPr>
-            <p:cNvPr id="4" name="Imagem 3"/>
-            <p:cNvPicPr>
-              <a:picLocks noChangeAspect="1"/>
-            </p:cNvPicPr>
-            <p:nvPr/>
-          </p:nvPicPr>
-          <p:blipFill>
-            <a:blip r:embed="rId4">
-              <a:extLst>
-                <a:ext uri="{28A0092B-C50C-407E-A947-70E740481C1C}">
-                  <a14:useLocalDpi xmlns:a14="http://schemas.microsoft.com/office/drawing/2010/main" val="0"/>
-                </a:ext>
-              </a:extLst>
-            </a:blip>
-            <a:stretch>
-              <a:fillRect/>
-            </a:stretch>
-          </p:blipFill>
-          <p:spPr>
-            <a:xfrm>
-              <a:off x="3520969" y="794353"/>
-              <a:ext cx="8198068" cy="741132"/>
-            </a:xfrm>
-            <a:prstGeom prst="rect">
-              <a:avLst/>
-            </a:prstGeom>
-          </p:spPr>
-        </p:pic>
-        <p:pic>
-          <p:nvPicPr>
-            <p:cNvPr id="5" name="Imagem 4"/>
-            <p:cNvPicPr>
-              <a:picLocks noChangeAspect="1"/>
-            </p:cNvPicPr>
-            <p:nvPr/>
-          </p:nvPicPr>
-          <p:blipFill>
-            <a:blip r:embed="rId5">
-              <a:extLst>
-                <a:ext uri="{28A0092B-C50C-407E-A947-70E740481C1C}">
-                  <a14:useLocalDpi xmlns:a14="http://schemas.microsoft.com/office/drawing/2010/main" val="0"/>
-                </a:ext>
-              </a:extLst>
-            </a:blip>
-            <a:stretch>
-              <a:fillRect/>
-            </a:stretch>
-          </p:blipFill>
-          <p:spPr>
-            <a:xfrm>
-              <a:off x="3520969" y="1563131"/>
-              <a:ext cx="8198068" cy="3808992"/>
-            </a:xfrm>
-            <a:prstGeom prst="rect">
-              <a:avLst/>
-            </a:prstGeom>
-          </p:spPr>
-        </p:pic>
-        <p:pic>
-          <p:nvPicPr>
-            <p:cNvPr id="6" name="Imagem 5"/>
-            <p:cNvPicPr>
-              <a:picLocks noChangeAspect="1"/>
-            </p:cNvPicPr>
-            <p:nvPr/>
-          </p:nvPicPr>
-          <p:blipFill>
-            <a:blip r:embed="rId6">
-              <a:extLst>
-                <a:ext uri="{28A0092B-C50C-407E-A947-70E740481C1C}">
-                  <a14:useLocalDpi xmlns:a14="http://schemas.microsoft.com/office/drawing/2010/main" val="0"/>
-                </a:ext>
-              </a:extLst>
-            </a:blip>
-            <a:stretch>
-              <a:fillRect/>
-            </a:stretch>
-          </p:blipFill>
-          <p:spPr>
-            <a:xfrm>
-              <a:off x="3599459" y="4838801"/>
-              <a:ext cx="8041087" cy="1259043"/>
-            </a:xfrm>
-            <a:prstGeom prst="rect">
-              <a:avLst/>
-            </a:prstGeom>
-          </p:spPr>
-        </p:pic>
-      </p:grpSp>
+      <p:sp>
+        <p:nvSpPr>
+          <p:cNvPr id="3" name="Espaço Reservado para Conteúdo 2"/>
+          <p:cNvSpPr>
+            <a:spLocks noGrp="1"/>
+          </p:cNvSpPr>
+          <p:nvPr>
+            <p:ph idx="1"/>
+          </p:nvPr>
+        </p:nvSpPr>
+        <p:spPr/>
+        <p:txBody>
+          <a:bodyPr/>
+          <a:lstStyle/>
+          <a:p>
+            <a:endParaRPr lang="pt-BR"/>
+          </a:p>
+        </p:txBody>
+      </p:sp>
     </p:spTree>
     <p:extLst>
       <p:ext uri="{BB962C8B-B14F-4D97-AF65-F5344CB8AC3E}">
-        <p14:creationId xmlns:p14="http://schemas.microsoft.com/office/powerpoint/2010/main" val="1829882056"/>
+        <p14:creationId xmlns:p14="http://schemas.microsoft.com/office/powerpoint/2010/main" val="1495723128"/>
       </p:ext>
     </p:extLst>
   </p:cSld>
   <p:clrMapOvr>
     <a:masterClrMapping/>
   </p:clrMapOvr>
+  <p:timing>
+    <p:tnLst>
+      <p:par>
+        <p:cTn id="1" dur="indefinite" restart="never" nodeType="tmRoot"/>
+      </p:par>
+    </p:tnLst>
+  </p:timing>
 </p:sld>
 </file>
 

</xml_diff>